<commit_message>
Chatper 1 almost done.
</commit_message>
<xml_diff>
--- a/Dissertation/stuff/PPT4Images.pptx
+++ b/Dissertation/stuff/PPT4Images.pptx
@@ -5,11 +5,14 @@
     <p:sldMasterId id="2147483648" r:id="rId1"/>
   </p:sldMasterIdLst>
   <p:notesMasterIdLst>
-    <p:notesMasterId r:id="rId4"/>
+    <p:notesMasterId r:id="rId7"/>
   </p:notesMasterIdLst>
   <p:sldIdLst>
     <p:sldId id="257" r:id="rId2"/>
     <p:sldId id="258" r:id="rId3"/>
+    <p:sldId id="259" r:id="rId4"/>
+    <p:sldId id="260" r:id="rId5"/>
+    <p:sldId id="261" r:id="rId6"/>
   </p:sldIdLst>
   <p:sldSz cx="9144000" cy="6858000" type="screen4x3"/>
   <p:notesSz cx="6858000" cy="9144000"/>
@@ -193,7 +196,7 @@
           <a:p>
             <a:fld id="{DB093CF4-EDDC-4D53-AA66-B3715FC9EAB3}" type="datetimeFigureOut">
               <a:rPr lang="en-US" smtClean="0"/>
-              <a:t>11/4/2013</a:t>
+              <a:t>11/13/2013</a:t>
             </a:fld>
             <a:endParaRPr lang="en-US"/>
           </a:p>
@@ -625,6 +628,288 @@
 </p:notes>
 </file>
 
+<file path=ppt/notesSlides/notesSlide3.xml><?xml version="1.0" encoding="utf-8"?>
+<p:notes xmlns:a="http://schemas.openxmlformats.org/drawingml/2006/main" xmlns:r="http://schemas.openxmlformats.org/officeDocument/2006/relationships" xmlns:p="http://schemas.openxmlformats.org/presentationml/2006/main">
+  <p:cSld>
+    <p:spTree>
+      <p:nvGrpSpPr>
+        <p:cNvPr id="1" name=""/>
+        <p:cNvGrpSpPr/>
+        <p:nvPr/>
+      </p:nvGrpSpPr>
+      <p:grpSpPr>
+        <a:xfrm>
+          <a:off x="0" y="0"/>
+          <a:ext cx="0" cy="0"/>
+          <a:chOff x="0" y="0"/>
+          <a:chExt cx="0" cy="0"/>
+        </a:xfrm>
+      </p:grpSpPr>
+      <p:sp>
+        <p:nvSpPr>
+          <p:cNvPr id="2" name="Slide Image Placeholder 1"/>
+          <p:cNvSpPr>
+            <a:spLocks noGrp="1" noRot="1" noChangeAspect="1"/>
+          </p:cNvSpPr>
+          <p:nvPr>
+            <p:ph type="sldImg"/>
+          </p:nvPr>
+        </p:nvSpPr>
+        <p:spPr/>
+      </p:sp>
+      <p:sp>
+        <p:nvSpPr>
+          <p:cNvPr id="3" name="Notes Placeholder 2"/>
+          <p:cNvSpPr>
+            <a:spLocks noGrp="1"/>
+          </p:cNvSpPr>
+          <p:nvPr>
+            <p:ph type="body" idx="1"/>
+          </p:nvPr>
+        </p:nvSpPr>
+        <p:spPr/>
+        <p:txBody>
+          <a:bodyPr>
+            <a:normAutofit/>
+          </a:bodyPr>
+          <a:lstStyle/>
+          <a:p>
+            <a:r>
+              <a:rPr lang="en-US" dirty="0" smtClean="0"/>
+              <a:t>Explain why areas of focus changed into prob. Dist.</a:t>
+            </a:r>
+            <a:endParaRPr lang="en-US" dirty="0"/>
+          </a:p>
+        </p:txBody>
+      </p:sp>
+      <p:sp>
+        <p:nvSpPr>
+          <p:cNvPr id="4" name="Slide Number Placeholder 3"/>
+          <p:cNvSpPr>
+            <a:spLocks noGrp="1"/>
+          </p:cNvSpPr>
+          <p:nvPr>
+            <p:ph type="sldNum" sz="quarter" idx="10"/>
+          </p:nvPr>
+        </p:nvSpPr>
+        <p:spPr/>
+        <p:txBody>
+          <a:bodyPr/>
+          <a:lstStyle/>
+          <a:p>
+            <a:fld id="{BB99AAEF-53F9-4487-A0BF-601B7F016E22}" type="slidenum">
+              <a:rPr lang="en-US" smtClean="0"/>
+              <a:pPr/>
+              <a:t>3</a:t>
+            </a:fld>
+            <a:endParaRPr lang="en-US" dirty="0"/>
+          </a:p>
+        </p:txBody>
+      </p:sp>
+    </p:spTree>
+  </p:cSld>
+  <p:clrMapOvr>
+    <a:masterClrMapping/>
+  </p:clrMapOvr>
+</p:notes>
+</file>
+
+<file path=ppt/notesSlides/notesSlide4.xml><?xml version="1.0" encoding="utf-8"?>
+<p:notes xmlns:a="http://schemas.openxmlformats.org/drawingml/2006/main" xmlns:r="http://schemas.openxmlformats.org/officeDocument/2006/relationships" xmlns:p="http://schemas.openxmlformats.org/presentationml/2006/main">
+  <p:cSld>
+    <p:spTree>
+      <p:nvGrpSpPr>
+        <p:cNvPr id="1" name=""/>
+        <p:cNvGrpSpPr/>
+        <p:nvPr/>
+      </p:nvGrpSpPr>
+      <p:grpSpPr>
+        <a:xfrm>
+          <a:off x="0" y="0"/>
+          <a:ext cx="0" cy="0"/>
+          <a:chOff x="0" y="0"/>
+          <a:chExt cx="0" cy="0"/>
+        </a:xfrm>
+      </p:grpSpPr>
+      <p:sp>
+        <p:nvSpPr>
+          <p:cNvPr id="2" name="Slide Image Placeholder 1"/>
+          <p:cNvSpPr>
+            <a:spLocks noGrp="1" noRot="1" noChangeAspect="1"/>
+          </p:cNvSpPr>
+          <p:nvPr>
+            <p:ph type="sldImg"/>
+          </p:nvPr>
+        </p:nvSpPr>
+        <p:spPr/>
+      </p:sp>
+      <p:sp>
+        <p:nvSpPr>
+          <p:cNvPr id="3" name="Notes Placeholder 2"/>
+          <p:cNvSpPr>
+            <a:spLocks noGrp="1"/>
+          </p:cNvSpPr>
+          <p:nvPr>
+            <p:ph type="body" idx="1"/>
+          </p:nvPr>
+        </p:nvSpPr>
+        <p:spPr/>
+        <p:txBody>
+          <a:bodyPr>
+            <a:normAutofit/>
+          </a:bodyPr>
+          <a:lstStyle/>
+          <a:p>
+            <a:r>
+              <a:rPr lang="en-US" dirty="0" smtClean="0"/>
+              <a:t>D. Normal 7 stages: 1. Formulation of the goal</a:t>
+            </a:r>
+            <a:r>
+              <a:rPr lang="en-US" baseline="0" dirty="0" smtClean="0"/>
+              <a:t>. 2. Formulation of the intention. 3. Specification of the action. 4. Execution of the action. 5. Perception of the system state. 6. Interpretation of the system state. 7. Evaluation of the outcome.</a:t>
+            </a:r>
+          </a:p>
+          <a:p>
+            <a:endParaRPr lang="en-US" baseline="0" dirty="0" smtClean="0"/>
+          </a:p>
+          <a:p>
+            <a:r>
+              <a:rPr lang="en-US" baseline="0" dirty="0" smtClean="0"/>
+              <a:t>Gulf of execution is a mismatch between the user’s intentions and the allowable actions in the system.</a:t>
+            </a:r>
+          </a:p>
+          <a:p>
+            <a:r>
+              <a:rPr lang="en-US" baseline="0" dirty="0" smtClean="0"/>
+              <a:t>Gulf of evaluation is a mismatch between the system’s representation and the user’s expectations.</a:t>
+            </a:r>
+          </a:p>
+          <a:p>
+            <a:endParaRPr lang="en-US" baseline="0" dirty="0" smtClean="0"/>
+          </a:p>
+          <a:p>
+            <a:r>
+              <a:rPr lang="en-US" baseline="0" dirty="0" smtClean="0"/>
+              <a:t>Abstract Supervisor: Division Chief, Logistics Technical Specialist, Staging Area Manager, Operations Chief, Incident Unified Commander</a:t>
+            </a:r>
+            <a:endParaRPr lang="en-US" dirty="0"/>
+          </a:p>
+        </p:txBody>
+      </p:sp>
+      <p:sp>
+        <p:nvSpPr>
+          <p:cNvPr id="4" name="Slide Number Placeholder 3"/>
+          <p:cNvSpPr>
+            <a:spLocks noGrp="1"/>
+          </p:cNvSpPr>
+          <p:nvPr>
+            <p:ph type="sldNum" sz="quarter" idx="10"/>
+          </p:nvPr>
+        </p:nvSpPr>
+        <p:spPr/>
+        <p:txBody>
+          <a:bodyPr/>
+          <a:lstStyle/>
+          <a:p>
+            <a:fld id="{BB99AAEF-53F9-4487-A0BF-601B7F016E22}" type="slidenum">
+              <a:rPr lang="en-US" smtClean="0"/>
+              <a:pPr/>
+              <a:t>4</a:t>
+            </a:fld>
+            <a:endParaRPr lang="en-US" dirty="0"/>
+          </a:p>
+        </p:txBody>
+      </p:sp>
+    </p:spTree>
+  </p:cSld>
+  <p:clrMapOvr>
+    <a:masterClrMapping/>
+  </p:clrMapOvr>
+</p:notes>
+</file>
+
+<file path=ppt/notesSlides/notesSlide5.xml><?xml version="1.0" encoding="utf-8"?>
+<p:notes xmlns:a="http://schemas.openxmlformats.org/drawingml/2006/main" xmlns:r="http://schemas.openxmlformats.org/officeDocument/2006/relationships" xmlns:p="http://schemas.openxmlformats.org/presentationml/2006/main">
+  <p:cSld>
+    <p:spTree>
+      <p:nvGrpSpPr>
+        <p:cNvPr id="1" name=""/>
+        <p:cNvGrpSpPr/>
+        <p:nvPr/>
+      </p:nvGrpSpPr>
+      <p:grpSpPr>
+        <a:xfrm>
+          <a:off x="0" y="0"/>
+          <a:ext cx="0" cy="0"/>
+          <a:chOff x="0" y="0"/>
+          <a:chExt cx="0" cy="0"/>
+        </a:xfrm>
+      </p:grpSpPr>
+      <p:sp>
+        <p:nvSpPr>
+          <p:cNvPr id="2" name="Slide Image Placeholder 1"/>
+          <p:cNvSpPr>
+            <a:spLocks noGrp="1" noRot="1" noChangeAspect="1"/>
+          </p:cNvSpPr>
+          <p:nvPr>
+            <p:ph type="sldImg"/>
+          </p:nvPr>
+        </p:nvSpPr>
+        <p:spPr/>
+      </p:sp>
+      <p:sp>
+        <p:nvSpPr>
+          <p:cNvPr id="3" name="Notes Placeholder 2"/>
+          <p:cNvSpPr>
+            <a:spLocks noGrp="1"/>
+          </p:cNvSpPr>
+          <p:nvPr>
+            <p:ph type="body" idx="1"/>
+          </p:nvPr>
+        </p:nvSpPr>
+        <p:spPr/>
+        <p:txBody>
+          <a:bodyPr>
+            <a:normAutofit/>
+          </a:bodyPr>
+          <a:lstStyle/>
+          <a:p>
+            <a:endParaRPr lang="en-US" dirty="0"/>
+          </a:p>
+        </p:txBody>
+      </p:sp>
+      <p:sp>
+        <p:nvSpPr>
+          <p:cNvPr id="4" name="Slide Number Placeholder 3"/>
+          <p:cNvSpPr>
+            <a:spLocks noGrp="1"/>
+          </p:cNvSpPr>
+          <p:nvPr>
+            <p:ph type="sldNum" sz="quarter" idx="10"/>
+          </p:nvPr>
+        </p:nvSpPr>
+        <p:spPr/>
+        <p:txBody>
+          <a:bodyPr/>
+          <a:lstStyle/>
+          <a:p>
+            <a:fld id="{BB99AAEF-53F9-4487-A0BF-601B7F016E22}" type="slidenum">
+              <a:rPr lang="en-US" smtClean="0"/>
+              <a:pPr/>
+              <a:t>5</a:t>
+            </a:fld>
+            <a:endParaRPr lang="en-US" dirty="0"/>
+          </a:p>
+        </p:txBody>
+      </p:sp>
+    </p:spTree>
+  </p:cSld>
+  <p:clrMapOvr>
+    <a:masterClrMapping/>
+  </p:clrMapOvr>
+</p:notes>
+</file>
+
 <file path=ppt/slideLayouts/slideLayout1.xml><?xml version="1.0" encoding="utf-8"?>
 <p:sldLayout xmlns:a="http://schemas.openxmlformats.org/drawingml/2006/main" xmlns:r="http://schemas.openxmlformats.org/officeDocument/2006/relationships" xmlns:p="http://schemas.openxmlformats.org/presentationml/2006/main" type="title" preserve="1">
   <p:cSld name="Title Slide">
@@ -806,7 +1091,7 @@
           <a:p>
             <a:fld id="{E59A9A59-1FB6-4F03-A185-470EB4E02CD0}" type="datetimeFigureOut">
               <a:rPr lang="en-US" smtClean="0"/>
-              <a:t>11/4/2013</a:t>
+              <a:t>11/13/2013</a:t>
             </a:fld>
             <a:endParaRPr lang="en-US"/>
           </a:p>
@@ -976,7 +1261,7 @@
           <a:p>
             <a:fld id="{E59A9A59-1FB6-4F03-A185-470EB4E02CD0}" type="datetimeFigureOut">
               <a:rPr lang="en-US" smtClean="0"/>
-              <a:t>11/4/2013</a:t>
+              <a:t>11/13/2013</a:t>
             </a:fld>
             <a:endParaRPr lang="en-US"/>
           </a:p>
@@ -1156,7 +1441,7 @@
           <a:p>
             <a:fld id="{E59A9A59-1FB6-4F03-A185-470EB4E02CD0}" type="datetimeFigureOut">
               <a:rPr lang="en-US" smtClean="0"/>
-              <a:t>11/4/2013</a:t>
+              <a:t>11/13/2013</a:t>
             </a:fld>
             <a:endParaRPr lang="en-US"/>
           </a:p>
@@ -1326,7 +1611,7 @@
           <a:p>
             <a:fld id="{E59A9A59-1FB6-4F03-A185-470EB4E02CD0}" type="datetimeFigureOut">
               <a:rPr lang="en-US" smtClean="0"/>
-              <a:t>11/4/2013</a:t>
+              <a:t>11/13/2013</a:t>
             </a:fld>
             <a:endParaRPr lang="en-US"/>
           </a:p>
@@ -1572,7 +1857,7 @@
           <a:p>
             <a:fld id="{E59A9A59-1FB6-4F03-A185-470EB4E02CD0}" type="datetimeFigureOut">
               <a:rPr lang="en-US" smtClean="0"/>
-              <a:t>11/4/2013</a:t>
+              <a:t>11/13/2013</a:t>
             </a:fld>
             <a:endParaRPr lang="en-US"/>
           </a:p>
@@ -1860,7 +2145,7 @@
           <a:p>
             <a:fld id="{E59A9A59-1FB6-4F03-A185-470EB4E02CD0}" type="datetimeFigureOut">
               <a:rPr lang="en-US" smtClean="0"/>
-              <a:t>11/4/2013</a:t>
+              <a:t>11/13/2013</a:t>
             </a:fld>
             <a:endParaRPr lang="en-US"/>
           </a:p>
@@ -2282,7 +2567,7 @@
           <a:p>
             <a:fld id="{E59A9A59-1FB6-4F03-A185-470EB4E02CD0}" type="datetimeFigureOut">
               <a:rPr lang="en-US" smtClean="0"/>
-              <a:t>11/4/2013</a:t>
+              <a:t>11/13/2013</a:t>
             </a:fld>
             <a:endParaRPr lang="en-US"/>
           </a:p>
@@ -2400,7 +2685,7 @@
           <a:p>
             <a:fld id="{E59A9A59-1FB6-4F03-A185-470EB4E02CD0}" type="datetimeFigureOut">
               <a:rPr lang="en-US" smtClean="0"/>
-              <a:t>11/4/2013</a:t>
+              <a:t>11/13/2013</a:t>
             </a:fld>
             <a:endParaRPr lang="en-US"/>
           </a:p>
@@ -2495,7 +2780,7 @@
           <a:p>
             <a:fld id="{E59A9A59-1FB6-4F03-A185-470EB4E02CD0}" type="datetimeFigureOut">
               <a:rPr lang="en-US" smtClean="0"/>
-              <a:t>11/4/2013</a:t>
+              <a:t>11/13/2013</a:t>
             </a:fld>
             <a:endParaRPr lang="en-US"/>
           </a:p>
@@ -2772,7 +3057,7 @@
           <a:p>
             <a:fld id="{E59A9A59-1FB6-4F03-A185-470EB4E02CD0}" type="datetimeFigureOut">
               <a:rPr lang="en-US" smtClean="0"/>
-              <a:t>11/4/2013</a:t>
+              <a:t>11/13/2013</a:t>
             </a:fld>
             <a:endParaRPr lang="en-US"/>
           </a:p>
@@ -3025,7 +3310,7 @@
           <a:p>
             <a:fld id="{E59A9A59-1FB6-4F03-A185-470EB4E02CD0}" type="datetimeFigureOut">
               <a:rPr lang="en-US" smtClean="0"/>
-              <a:t>11/4/2013</a:t>
+              <a:t>11/13/2013</a:t>
             </a:fld>
             <a:endParaRPr lang="en-US"/>
           </a:p>
@@ -3238,7 +3523,7 @@
           <a:p>
             <a:fld id="{E59A9A59-1FB6-4F03-A185-470EB4E02CD0}" type="datetimeFigureOut">
               <a:rPr lang="en-US" smtClean="0"/>
-              <a:t>11/4/2013</a:t>
+              <a:t>11/13/2013</a:t>
             </a:fld>
             <a:endParaRPr lang="en-US"/>
           </a:p>
@@ -4756,15 +5041,7 @@
                   <a:schemeClr val="tx1"/>
                 </a:solidFill>
               </a:rPr>
-              <a:t>Path </a:t>
-            </a:r>
-            <a:r>
-              <a:rPr lang="en-US" sz="1400" dirty="0" smtClean="0">
-                <a:solidFill>
-                  <a:schemeClr val="tx1"/>
-                </a:solidFill>
-              </a:rPr>
-              <a:t>Planner Algorithms &amp; Sliding Autonomy</a:t>
+              <a:t>Path Planner Algorithms &amp; Sliding Autonomy</a:t>
             </a:r>
             <a:endParaRPr lang="en-US" sz="1400" dirty="0">
               <a:solidFill>
@@ -5658,23 +5935,7 @@
                   <a:schemeClr val="tx1"/>
                 </a:solidFill>
               </a:rPr>
-              <a:t>Dist</a:t>
-            </a:r>
-            <a:r>
-              <a:rPr lang="en-US" sz="1400" dirty="0" smtClean="0">
-                <a:solidFill>
-                  <a:schemeClr val="tx1"/>
-                </a:solidFill>
-              </a:rPr>
-              <a:t>ribution &amp;</a:t>
-            </a:r>
-            <a:r>
-              <a:rPr lang="en-US" sz="1400" dirty="0" smtClean="0">
-                <a:solidFill>
-                  <a:schemeClr val="tx1"/>
-                </a:solidFill>
-              </a:rPr>
-              <a:t/>
+              <a:t>Distribution &amp;</a:t>
             </a:r>
             <a:br>
               <a:rPr lang="en-US" sz="1400" dirty="0" smtClean="0">
@@ -5689,15 +5950,7 @@
                   <a:schemeClr val="tx1"/>
                 </a:solidFill>
               </a:rPr>
-              <a:t>Task Difficulty </a:t>
-            </a:r>
-            <a:r>
-              <a:rPr lang="en-US" sz="1400" dirty="0" smtClean="0">
-                <a:solidFill>
-                  <a:schemeClr val="tx1"/>
-                </a:solidFill>
-              </a:rPr>
-              <a:t>Generation</a:t>
+              <a:t>Task Difficulty Generation</a:t>
             </a:r>
             <a:endParaRPr lang="en-US" sz="1400" dirty="0">
               <a:solidFill>
@@ -5759,11 +6012,11 @@
   <p:clrMapOvr>
     <a:masterClrMapping/>
   </p:clrMapOvr>
-  <mc:AlternateContent xmlns:mc="http://schemas.openxmlformats.org/markup-compatibility/2006">
-    <mc:Choice xmlns:p14="http://schemas.microsoft.com/office/powerpoint/2010/main" Requires="p14">
+  <mc:AlternateContent xmlns:mc="http://schemas.openxmlformats.org/markup-compatibility/2006" xmlns:p14="http://schemas.microsoft.com/office/powerpoint/2010/main">
+    <mc:Choice Requires="p14">
       <p:transition spd="slow" p14:dur="2000"/>
     </mc:Choice>
-    <mc:Fallback>
+    <mc:Fallback xmlns="">
       <p:transition spd="slow"/>
     </mc:Fallback>
   </mc:AlternateContent>
@@ -6683,6 +6936,2935 @@
     <p:extLst>
       <p:ext uri="{BB962C8B-B14F-4D97-AF65-F5344CB8AC3E}">
         <p14:creationId xmlns:p14="http://schemas.microsoft.com/office/powerpoint/2010/main" val="103009154"/>
+      </p:ext>
+    </p:extLst>
+  </p:cSld>
+  <p:clrMapOvr>
+    <a:masterClrMapping/>
+  </p:clrMapOvr>
+  <mc:AlternateContent xmlns:mc="http://schemas.openxmlformats.org/markup-compatibility/2006" xmlns:p14="http://schemas.microsoft.com/office/powerpoint/2010/main">
+    <mc:Choice Requires="p14">
+      <p:transition spd="slow" p14:dur="2000"/>
+    </mc:Choice>
+    <mc:Fallback xmlns="">
+      <p:transition spd="slow"/>
+    </mc:Fallback>
+  </mc:AlternateContent>
+  <p:timing>
+    <p:tnLst>
+      <p:par>
+        <p:cTn id="1" dur="indefinite" restart="never" nodeType="tmRoot"/>
+      </p:par>
+    </p:tnLst>
+  </p:timing>
+</p:sld>
+</file>
+
+<file path=ppt/slides/slide3.xml><?xml version="1.0" encoding="utf-8"?>
+<p:sld xmlns:a="http://schemas.openxmlformats.org/drawingml/2006/main" xmlns:r="http://schemas.openxmlformats.org/officeDocument/2006/relationships" xmlns:p="http://schemas.openxmlformats.org/presentationml/2006/main">
+  <p:cSld>
+    <p:spTree>
+      <p:nvGrpSpPr>
+        <p:cNvPr id="1" name=""/>
+        <p:cNvGrpSpPr/>
+        <p:nvPr/>
+      </p:nvGrpSpPr>
+      <p:grpSpPr>
+        <a:xfrm>
+          <a:off x="0" y="0"/>
+          <a:ext cx="0" cy="0"/>
+          <a:chOff x="0" y="0"/>
+          <a:chExt cx="0" cy="0"/>
+        </a:xfrm>
+      </p:grpSpPr>
+      <p:sp>
+        <p:nvSpPr>
+          <p:cNvPr id="2" name="Title 1"/>
+          <p:cNvSpPr>
+            <a:spLocks noGrp="1"/>
+          </p:cNvSpPr>
+          <p:nvPr>
+            <p:ph type="title"/>
+          </p:nvPr>
+        </p:nvSpPr>
+        <p:spPr>
+          <a:xfrm>
+            <a:off x="1066800" y="274638"/>
+            <a:ext cx="7866888" cy="563562"/>
+          </a:xfrm>
+        </p:spPr>
+        <p:txBody>
+          <a:bodyPr>
+            <a:normAutofit/>
+          </a:bodyPr>
+          <a:lstStyle/>
+          <a:p>
+            <a:r>
+              <a:rPr lang="en-US" sz="2800" dirty="0" smtClean="0">
+                <a:latin typeface="Arial Narrow" pitchFamily="34" charset="0"/>
+              </a:rPr>
+              <a:t>Proposed Solution</a:t>
+            </a:r>
+            <a:endParaRPr lang="en-US" sz="2800" dirty="0">
+              <a:latin typeface="Arial Narrow" pitchFamily="34" charset="0"/>
+            </a:endParaRPr>
+          </a:p>
+        </p:txBody>
+      </p:sp>
+      <p:sp>
+        <p:nvSpPr>
+          <p:cNvPr id="3" name="Content Placeholder 2"/>
+          <p:cNvSpPr>
+            <a:spLocks noGrp="1"/>
+          </p:cNvSpPr>
+          <p:nvPr>
+            <p:ph idx="1"/>
+          </p:nvPr>
+        </p:nvSpPr>
+        <p:spPr>
+          <a:xfrm>
+            <a:off x="990600" y="914400"/>
+            <a:ext cx="8153400" cy="5562600"/>
+          </a:xfrm>
+        </p:spPr>
+        <p:txBody>
+          <a:bodyPr/>
+          <a:lstStyle/>
+          <a:p>
+            <a:r>
+              <a:rPr lang="en-US" sz="2000" dirty="0" smtClean="0">
+                <a:latin typeface="Arial Narrow" pitchFamily="34" charset="0"/>
+              </a:rPr>
+              <a:t>Using UAV to support Wilderness Search and Rescue</a:t>
+            </a:r>
+          </a:p>
+          <a:p>
+            <a:pPr lvl="1"/>
+            <a:r>
+              <a:rPr lang="en-US" sz="1600" dirty="0" smtClean="0">
+                <a:latin typeface="Arial Narrow" pitchFamily="34" charset="0"/>
+              </a:rPr>
+              <a:t>What does the three scales mean?</a:t>
+            </a:r>
+          </a:p>
+          <a:p>
+            <a:pPr lvl="1"/>
+            <a:r>
+              <a:rPr lang="en-US" sz="1600" dirty="0" smtClean="0">
+                <a:latin typeface="Arial Narrow" pitchFamily="34" charset="0"/>
+              </a:rPr>
+              <a:t>What are the information representations?</a:t>
+            </a:r>
+          </a:p>
+        </p:txBody>
+      </p:sp>
+      <p:sp>
+        <p:nvSpPr>
+          <p:cNvPr id="5" name="Rectangle 4"/>
+          <p:cNvSpPr/>
+          <p:nvPr/>
+        </p:nvSpPr>
+        <p:spPr>
+          <a:xfrm>
+            <a:off x="1219200" y="868362"/>
+            <a:ext cx="7620000" cy="45719"/>
+          </a:xfrm>
+          <a:prstGeom prst="rect">
+            <a:avLst/>
+          </a:prstGeom>
+          <a:gradFill>
+            <a:gsLst>
+              <a:gs pos="0">
+                <a:schemeClr val="accent1"/>
+              </a:gs>
+              <a:gs pos="50000">
+                <a:schemeClr val="accent1">
+                  <a:tint val="44500"/>
+                  <a:satMod val="160000"/>
+                </a:schemeClr>
+              </a:gs>
+              <a:gs pos="100000">
+                <a:schemeClr val="accent1">
+                  <a:tint val="23500"/>
+                  <a:satMod val="160000"/>
+                </a:schemeClr>
+              </a:gs>
+            </a:gsLst>
+            <a:lin ang="5400000" scaled="0"/>
+          </a:gradFill>
+          <a:ln>
+            <a:noFill/>
+          </a:ln>
+        </p:spPr>
+        <p:style>
+          <a:lnRef idx="2">
+            <a:schemeClr val="accent1">
+              <a:shade val="50000"/>
+            </a:schemeClr>
+          </a:lnRef>
+          <a:fillRef idx="1">
+            <a:schemeClr val="accent1"/>
+          </a:fillRef>
+          <a:effectRef idx="0">
+            <a:schemeClr val="accent1"/>
+          </a:effectRef>
+          <a:fontRef idx="minor">
+            <a:schemeClr val="lt1"/>
+          </a:fontRef>
+        </p:style>
+        <p:txBody>
+          <a:bodyPr rtlCol="0" anchor="ctr"/>
+          <a:lstStyle/>
+          <a:p>
+            <a:pPr algn="ctr"/>
+            <a:endParaRPr lang="en-US" dirty="0"/>
+          </a:p>
+        </p:txBody>
+      </p:sp>
+      <p:pic>
+        <p:nvPicPr>
+          <p:cNvPr id="1026" name="Picture 2" descr="C:\Lanny\13 Lanny's PhD Proposal\3DMapDiff.jpg"/>
+          <p:cNvPicPr>
+            <a:picLocks noChangeAspect="1" noChangeArrowheads="1"/>
+          </p:cNvPicPr>
+          <p:nvPr/>
+        </p:nvPicPr>
+        <p:blipFill>
+          <a:blip r:embed="rId3" cstate="print"/>
+          <a:srcRect/>
+          <a:stretch>
+            <a:fillRect/>
+          </a:stretch>
+        </p:blipFill>
+        <p:spPr bwMode="auto">
+          <a:xfrm>
+            <a:off x="4419600" y="2209800"/>
+            <a:ext cx="914400" cy="912085"/>
+          </a:xfrm>
+          <a:prstGeom prst="rect">
+            <a:avLst/>
+          </a:prstGeom>
+          <a:noFill/>
+        </p:spPr>
+      </p:pic>
+      <p:pic>
+        <p:nvPicPr>
+          <p:cNvPr id="1027" name="Picture 3" descr="C:\Lanny\13 Lanny's PhD Proposal\3DMapDist.jpg"/>
+          <p:cNvPicPr>
+            <a:picLocks noChangeAspect="1" noChangeArrowheads="1"/>
+          </p:cNvPicPr>
+          <p:nvPr/>
+        </p:nvPicPr>
+        <p:blipFill>
+          <a:blip r:embed="rId4" cstate="print"/>
+          <a:srcRect/>
+          <a:stretch>
+            <a:fillRect/>
+          </a:stretch>
+        </p:blipFill>
+        <p:spPr bwMode="auto">
+          <a:xfrm>
+            <a:off x="3200400" y="2057400"/>
+            <a:ext cx="1066800" cy="1064099"/>
+          </a:xfrm>
+          <a:prstGeom prst="rect">
+            <a:avLst/>
+          </a:prstGeom>
+          <a:noFill/>
+        </p:spPr>
+      </p:pic>
+      <p:sp>
+        <p:nvSpPr>
+          <p:cNvPr id="18" name="Rectangle 17"/>
+          <p:cNvSpPr/>
+          <p:nvPr/>
+        </p:nvSpPr>
+        <p:spPr>
+          <a:xfrm>
+            <a:off x="1594746" y="3581400"/>
+            <a:ext cx="4038600" cy="3048000"/>
+          </a:xfrm>
+          <a:prstGeom prst="rect">
+            <a:avLst/>
+          </a:prstGeom>
+          <a:noFill/>
+          <a:ln>
+            <a:solidFill>
+              <a:schemeClr val="tx1"/>
+            </a:solidFill>
+          </a:ln>
+        </p:spPr>
+        <p:style>
+          <a:lnRef idx="2">
+            <a:schemeClr val="accent1">
+              <a:shade val="50000"/>
+            </a:schemeClr>
+          </a:lnRef>
+          <a:fillRef idx="1">
+            <a:schemeClr val="accent1"/>
+          </a:fillRef>
+          <a:effectRef idx="0">
+            <a:schemeClr val="accent1"/>
+          </a:effectRef>
+          <a:fontRef idx="minor">
+            <a:schemeClr val="lt1"/>
+          </a:fontRef>
+        </p:style>
+        <p:txBody>
+          <a:bodyPr rtlCol="0" anchor="ctr"/>
+          <a:lstStyle>
+            <a:defPPr>
+              <a:defRPr lang="en-US"/>
+            </a:defPPr>
+            <a:lvl1pPr marL="0" algn="l" defTabSz="914400" rtl="0" eaLnBrk="1" latinLnBrk="0" hangingPunct="1">
+              <a:defRPr sz="1800" kern="1200">
+                <a:solidFill>
+                  <a:schemeClr val="lt1"/>
+                </a:solidFill>
+                <a:latin typeface="+mn-lt"/>
+                <a:ea typeface="+mn-ea"/>
+                <a:cs typeface="+mn-cs"/>
+              </a:defRPr>
+            </a:lvl1pPr>
+            <a:lvl2pPr marL="457200" algn="l" defTabSz="914400" rtl="0" eaLnBrk="1" latinLnBrk="0" hangingPunct="1">
+              <a:defRPr sz="1800" kern="1200">
+                <a:solidFill>
+                  <a:schemeClr val="lt1"/>
+                </a:solidFill>
+                <a:latin typeface="+mn-lt"/>
+                <a:ea typeface="+mn-ea"/>
+                <a:cs typeface="+mn-cs"/>
+              </a:defRPr>
+            </a:lvl2pPr>
+            <a:lvl3pPr marL="914400" algn="l" defTabSz="914400" rtl="0" eaLnBrk="1" latinLnBrk="0" hangingPunct="1">
+              <a:defRPr sz="1800" kern="1200">
+                <a:solidFill>
+                  <a:schemeClr val="lt1"/>
+                </a:solidFill>
+                <a:latin typeface="+mn-lt"/>
+                <a:ea typeface="+mn-ea"/>
+                <a:cs typeface="+mn-cs"/>
+              </a:defRPr>
+            </a:lvl3pPr>
+            <a:lvl4pPr marL="1371600" algn="l" defTabSz="914400" rtl="0" eaLnBrk="1" latinLnBrk="0" hangingPunct="1">
+              <a:defRPr sz="1800" kern="1200">
+                <a:solidFill>
+                  <a:schemeClr val="lt1"/>
+                </a:solidFill>
+                <a:latin typeface="+mn-lt"/>
+                <a:ea typeface="+mn-ea"/>
+                <a:cs typeface="+mn-cs"/>
+              </a:defRPr>
+            </a:lvl4pPr>
+            <a:lvl5pPr marL="1828800" algn="l" defTabSz="914400" rtl="0" eaLnBrk="1" latinLnBrk="0" hangingPunct="1">
+              <a:defRPr sz="1800" kern="1200">
+                <a:solidFill>
+                  <a:schemeClr val="lt1"/>
+                </a:solidFill>
+                <a:latin typeface="+mn-lt"/>
+                <a:ea typeface="+mn-ea"/>
+                <a:cs typeface="+mn-cs"/>
+              </a:defRPr>
+            </a:lvl5pPr>
+            <a:lvl6pPr marL="2286000" algn="l" defTabSz="914400" rtl="0" eaLnBrk="1" latinLnBrk="0" hangingPunct="1">
+              <a:defRPr sz="1800" kern="1200">
+                <a:solidFill>
+                  <a:schemeClr val="lt1"/>
+                </a:solidFill>
+                <a:latin typeface="+mn-lt"/>
+                <a:ea typeface="+mn-ea"/>
+                <a:cs typeface="+mn-cs"/>
+              </a:defRPr>
+            </a:lvl6pPr>
+            <a:lvl7pPr marL="2743200" algn="l" defTabSz="914400" rtl="0" eaLnBrk="1" latinLnBrk="0" hangingPunct="1">
+              <a:defRPr sz="1800" kern="1200">
+                <a:solidFill>
+                  <a:schemeClr val="lt1"/>
+                </a:solidFill>
+                <a:latin typeface="+mn-lt"/>
+                <a:ea typeface="+mn-ea"/>
+                <a:cs typeface="+mn-cs"/>
+              </a:defRPr>
+            </a:lvl7pPr>
+            <a:lvl8pPr marL="3200400" algn="l" defTabSz="914400" rtl="0" eaLnBrk="1" latinLnBrk="0" hangingPunct="1">
+              <a:defRPr sz="1800" kern="1200">
+                <a:solidFill>
+                  <a:schemeClr val="lt1"/>
+                </a:solidFill>
+                <a:latin typeface="+mn-lt"/>
+                <a:ea typeface="+mn-ea"/>
+                <a:cs typeface="+mn-cs"/>
+              </a:defRPr>
+            </a:lvl8pPr>
+            <a:lvl9pPr marL="3657600" algn="l" defTabSz="914400" rtl="0" eaLnBrk="1" latinLnBrk="0" hangingPunct="1">
+              <a:defRPr sz="1800" kern="1200">
+                <a:solidFill>
+                  <a:schemeClr val="lt1"/>
+                </a:solidFill>
+                <a:latin typeface="+mn-lt"/>
+                <a:ea typeface="+mn-ea"/>
+                <a:cs typeface="+mn-cs"/>
+              </a:defRPr>
+            </a:lvl9pPr>
+          </a:lstStyle>
+          <a:p>
+            <a:pPr algn="ctr"/>
+            <a:endParaRPr lang="en-US">
+              <a:latin typeface="Calibri" pitchFamily="34" charset="0"/>
+              <a:cs typeface="Calibri" pitchFamily="34" charset="0"/>
+            </a:endParaRPr>
+          </a:p>
+        </p:txBody>
+      </p:sp>
+      <p:sp>
+        <p:nvSpPr>
+          <p:cNvPr id="19" name="Rectangle 18"/>
+          <p:cNvSpPr/>
+          <p:nvPr/>
+        </p:nvSpPr>
+        <p:spPr>
+          <a:xfrm>
+            <a:off x="1978152" y="4419600"/>
+            <a:ext cx="3502794" cy="2057400"/>
+          </a:xfrm>
+          <a:prstGeom prst="rect">
+            <a:avLst/>
+          </a:prstGeom>
+          <a:noFill/>
+          <a:ln>
+            <a:solidFill>
+              <a:schemeClr val="tx1"/>
+            </a:solidFill>
+          </a:ln>
+        </p:spPr>
+        <p:style>
+          <a:lnRef idx="2">
+            <a:schemeClr val="accent1">
+              <a:shade val="50000"/>
+            </a:schemeClr>
+          </a:lnRef>
+          <a:fillRef idx="1">
+            <a:schemeClr val="accent1"/>
+          </a:fillRef>
+          <a:effectRef idx="0">
+            <a:schemeClr val="accent1"/>
+          </a:effectRef>
+          <a:fontRef idx="minor">
+            <a:schemeClr val="lt1"/>
+          </a:fontRef>
+        </p:style>
+        <p:txBody>
+          <a:bodyPr rtlCol="0" anchor="ctr"/>
+          <a:lstStyle>
+            <a:defPPr>
+              <a:defRPr lang="en-US"/>
+            </a:defPPr>
+            <a:lvl1pPr marL="0" algn="l" defTabSz="914400" rtl="0" eaLnBrk="1" latinLnBrk="0" hangingPunct="1">
+              <a:defRPr sz="1800" kern="1200">
+                <a:solidFill>
+                  <a:schemeClr val="lt1"/>
+                </a:solidFill>
+                <a:latin typeface="+mn-lt"/>
+                <a:ea typeface="+mn-ea"/>
+                <a:cs typeface="+mn-cs"/>
+              </a:defRPr>
+            </a:lvl1pPr>
+            <a:lvl2pPr marL="457200" algn="l" defTabSz="914400" rtl="0" eaLnBrk="1" latinLnBrk="0" hangingPunct="1">
+              <a:defRPr sz="1800" kern="1200">
+                <a:solidFill>
+                  <a:schemeClr val="lt1"/>
+                </a:solidFill>
+                <a:latin typeface="+mn-lt"/>
+                <a:ea typeface="+mn-ea"/>
+                <a:cs typeface="+mn-cs"/>
+              </a:defRPr>
+            </a:lvl2pPr>
+            <a:lvl3pPr marL="914400" algn="l" defTabSz="914400" rtl="0" eaLnBrk="1" latinLnBrk="0" hangingPunct="1">
+              <a:defRPr sz="1800" kern="1200">
+                <a:solidFill>
+                  <a:schemeClr val="lt1"/>
+                </a:solidFill>
+                <a:latin typeface="+mn-lt"/>
+                <a:ea typeface="+mn-ea"/>
+                <a:cs typeface="+mn-cs"/>
+              </a:defRPr>
+            </a:lvl3pPr>
+            <a:lvl4pPr marL="1371600" algn="l" defTabSz="914400" rtl="0" eaLnBrk="1" latinLnBrk="0" hangingPunct="1">
+              <a:defRPr sz="1800" kern="1200">
+                <a:solidFill>
+                  <a:schemeClr val="lt1"/>
+                </a:solidFill>
+                <a:latin typeface="+mn-lt"/>
+                <a:ea typeface="+mn-ea"/>
+                <a:cs typeface="+mn-cs"/>
+              </a:defRPr>
+            </a:lvl4pPr>
+            <a:lvl5pPr marL="1828800" algn="l" defTabSz="914400" rtl="0" eaLnBrk="1" latinLnBrk="0" hangingPunct="1">
+              <a:defRPr sz="1800" kern="1200">
+                <a:solidFill>
+                  <a:schemeClr val="lt1"/>
+                </a:solidFill>
+                <a:latin typeface="+mn-lt"/>
+                <a:ea typeface="+mn-ea"/>
+                <a:cs typeface="+mn-cs"/>
+              </a:defRPr>
+            </a:lvl5pPr>
+            <a:lvl6pPr marL="2286000" algn="l" defTabSz="914400" rtl="0" eaLnBrk="1" latinLnBrk="0" hangingPunct="1">
+              <a:defRPr sz="1800" kern="1200">
+                <a:solidFill>
+                  <a:schemeClr val="lt1"/>
+                </a:solidFill>
+                <a:latin typeface="+mn-lt"/>
+                <a:ea typeface="+mn-ea"/>
+                <a:cs typeface="+mn-cs"/>
+              </a:defRPr>
+            </a:lvl6pPr>
+            <a:lvl7pPr marL="2743200" algn="l" defTabSz="914400" rtl="0" eaLnBrk="1" latinLnBrk="0" hangingPunct="1">
+              <a:defRPr sz="1800" kern="1200">
+                <a:solidFill>
+                  <a:schemeClr val="lt1"/>
+                </a:solidFill>
+                <a:latin typeface="+mn-lt"/>
+                <a:ea typeface="+mn-ea"/>
+                <a:cs typeface="+mn-cs"/>
+              </a:defRPr>
+            </a:lvl7pPr>
+            <a:lvl8pPr marL="3200400" algn="l" defTabSz="914400" rtl="0" eaLnBrk="1" latinLnBrk="0" hangingPunct="1">
+              <a:defRPr sz="1800" kern="1200">
+                <a:solidFill>
+                  <a:schemeClr val="lt1"/>
+                </a:solidFill>
+                <a:latin typeface="+mn-lt"/>
+                <a:ea typeface="+mn-ea"/>
+                <a:cs typeface="+mn-cs"/>
+              </a:defRPr>
+            </a:lvl8pPr>
+            <a:lvl9pPr marL="3657600" algn="l" defTabSz="914400" rtl="0" eaLnBrk="1" latinLnBrk="0" hangingPunct="1">
+              <a:defRPr sz="1800" kern="1200">
+                <a:solidFill>
+                  <a:schemeClr val="lt1"/>
+                </a:solidFill>
+                <a:latin typeface="+mn-lt"/>
+                <a:ea typeface="+mn-ea"/>
+                <a:cs typeface="+mn-cs"/>
+              </a:defRPr>
+            </a:lvl9pPr>
+          </a:lstStyle>
+          <a:p>
+            <a:pPr algn="ctr"/>
+            <a:endParaRPr lang="en-US">
+              <a:latin typeface="Calibri" pitchFamily="34" charset="0"/>
+              <a:cs typeface="Calibri" pitchFamily="34" charset="0"/>
+            </a:endParaRPr>
+          </a:p>
+        </p:txBody>
+      </p:sp>
+      <p:sp>
+        <p:nvSpPr>
+          <p:cNvPr id="20" name="Rectangle 19"/>
+          <p:cNvSpPr/>
+          <p:nvPr/>
+        </p:nvSpPr>
+        <p:spPr>
+          <a:xfrm>
+            <a:off x="2435352" y="5029200"/>
+            <a:ext cx="2893194" cy="1295400"/>
+          </a:xfrm>
+          <a:prstGeom prst="rect">
+            <a:avLst/>
+          </a:prstGeom>
+          <a:noFill/>
+          <a:ln>
+            <a:solidFill>
+              <a:schemeClr val="tx1"/>
+            </a:solidFill>
+          </a:ln>
+        </p:spPr>
+        <p:style>
+          <a:lnRef idx="2">
+            <a:schemeClr val="accent1">
+              <a:shade val="50000"/>
+            </a:schemeClr>
+          </a:lnRef>
+          <a:fillRef idx="1">
+            <a:schemeClr val="accent1"/>
+          </a:fillRef>
+          <a:effectRef idx="0">
+            <a:schemeClr val="accent1"/>
+          </a:effectRef>
+          <a:fontRef idx="minor">
+            <a:schemeClr val="lt1"/>
+          </a:fontRef>
+        </p:style>
+        <p:txBody>
+          <a:bodyPr rtlCol="0" anchor="ctr"/>
+          <a:lstStyle>
+            <a:defPPr>
+              <a:defRPr lang="en-US"/>
+            </a:defPPr>
+            <a:lvl1pPr marL="0" algn="l" defTabSz="914400" rtl="0" eaLnBrk="1" latinLnBrk="0" hangingPunct="1">
+              <a:defRPr sz="1800" kern="1200">
+                <a:solidFill>
+                  <a:schemeClr val="lt1"/>
+                </a:solidFill>
+                <a:latin typeface="+mn-lt"/>
+                <a:ea typeface="+mn-ea"/>
+                <a:cs typeface="+mn-cs"/>
+              </a:defRPr>
+            </a:lvl1pPr>
+            <a:lvl2pPr marL="457200" algn="l" defTabSz="914400" rtl="0" eaLnBrk="1" latinLnBrk="0" hangingPunct="1">
+              <a:defRPr sz="1800" kern="1200">
+                <a:solidFill>
+                  <a:schemeClr val="lt1"/>
+                </a:solidFill>
+                <a:latin typeface="+mn-lt"/>
+                <a:ea typeface="+mn-ea"/>
+                <a:cs typeface="+mn-cs"/>
+              </a:defRPr>
+            </a:lvl2pPr>
+            <a:lvl3pPr marL="914400" algn="l" defTabSz="914400" rtl="0" eaLnBrk="1" latinLnBrk="0" hangingPunct="1">
+              <a:defRPr sz="1800" kern="1200">
+                <a:solidFill>
+                  <a:schemeClr val="lt1"/>
+                </a:solidFill>
+                <a:latin typeface="+mn-lt"/>
+                <a:ea typeface="+mn-ea"/>
+                <a:cs typeface="+mn-cs"/>
+              </a:defRPr>
+            </a:lvl3pPr>
+            <a:lvl4pPr marL="1371600" algn="l" defTabSz="914400" rtl="0" eaLnBrk="1" latinLnBrk="0" hangingPunct="1">
+              <a:defRPr sz="1800" kern="1200">
+                <a:solidFill>
+                  <a:schemeClr val="lt1"/>
+                </a:solidFill>
+                <a:latin typeface="+mn-lt"/>
+                <a:ea typeface="+mn-ea"/>
+                <a:cs typeface="+mn-cs"/>
+              </a:defRPr>
+            </a:lvl4pPr>
+            <a:lvl5pPr marL="1828800" algn="l" defTabSz="914400" rtl="0" eaLnBrk="1" latinLnBrk="0" hangingPunct="1">
+              <a:defRPr sz="1800" kern="1200">
+                <a:solidFill>
+                  <a:schemeClr val="lt1"/>
+                </a:solidFill>
+                <a:latin typeface="+mn-lt"/>
+                <a:ea typeface="+mn-ea"/>
+                <a:cs typeface="+mn-cs"/>
+              </a:defRPr>
+            </a:lvl5pPr>
+            <a:lvl6pPr marL="2286000" algn="l" defTabSz="914400" rtl="0" eaLnBrk="1" latinLnBrk="0" hangingPunct="1">
+              <a:defRPr sz="1800" kern="1200">
+                <a:solidFill>
+                  <a:schemeClr val="lt1"/>
+                </a:solidFill>
+                <a:latin typeface="+mn-lt"/>
+                <a:ea typeface="+mn-ea"/>
+                <a:cs typeface="+mn-cs"/>
+              </a:defRPr>
+            </a:lvl6pPr>
+            <a:lvl7pPr marL="2743200" algn="l" defTabSz="914400" rtl="0" eaLnBrk="1" latinLnBrk="0" hangingPunct="1">
+              <a:defRPr sz="1800" kern="1200">
+                <a:solidFill>
+                  <a:schemeClr val="lt1"/>
+                </a:solidFill>
+                <a:latin typeface="+mn-lt"/>
+                <a:ea typeface="+mn-ea"/>
+                <a:cs typeface="+mn-cs"/>
+              </a:defRPr>
+            </a:lvl7pPr>
+            <a:lvl8pPr marL="3200400" algn="l" defTabSz="914400" rtl="0" eaLnBrk="1" latinLnBrk="0" hangingPunct="1">
+              <a:defRPr sz="1800" kern="1200">
+                <a:solidFill>
+                  <a:schemeClr val="lt1"/>
+                </a:solidFill>
+                <a:latin typeface="+mn-lt"/>
+                <a:ea typeface="+mn-ea"/>
+                <a:cs typeface="+mn-cs"/>
+              </a:defRPr>
+            </a:lvl8pPr>
+            <a:lvl9pPr marL="3657600" algn="l" defTabSz="914400" rtl="0" eaLnBrk="1" latinLnBrk="0" hangingPunct="1">
+              <a:defRPr sz="1800" kern="1200">
+                <a:solidFill>
+                  <a:schemeClr val="lt1"/>
+                </a:solidFill>
+                <a:latin typeface="+mn-lt"/>
+                <a:ea typeface="+mn-ea"/>
+                <a:cs typeface="+mn-cs"/>
+              </a:defRPr>
+            </a:lvl9pPr>
+          </a:lstStyle>
+          <a:p>
+            <a:pPr algn="ctr"/>
+            <a:endParaRPr lang="en-US">
+              <a:latin typeface="Calibri" pitchFamily="34" charset="0"/>
+              <a:cs typeface="Calibri" pitchFamily="34" charset="0"/>
+            </a:endParaRPr>
+          </a:p>
+        </p:txBody>
+      </p:sp>
+      <p:sp>
+        <p:nvSpPr>
+          <p:cNvPr id="22" name="TextBox 21"/>
+          <p:cNvSpPr txBox="1"/>
+          <p:nvPr/>
+        </p:nvSpPr>
+        <p:spPr>
+          <a:xfrm>
+            <a:off x="1594746" y="3581400"/>
+            <a:ext cx="739048" cy="276999"/>
+          </a:xfrm>
+          <a:prstGeom prst="rect">
+            <a:avLst/>
+          </a:prstGeom>
+          <a:noFill/>
+        </p:spPr>
+        <p:txBody>
+          <a:bodyPr wrap="none" rtlCol="0">
+            <a:spAutoFit/>
+          </a:bodyPr>
+          <a:lstStyle/>
+          <a:p>
+            <a:r>
+              <a:rPr lang="en-US" sz="1200" b="1" dirty="0" smtClean="0">
+                <a:latin typeface="Calibri" pitchFamily="34" charset="0"/>
+                <a:cs typeface="Calibri" pitchFamily="34" charset="0"/>
+              </a:rPr>
+              <a:t>Strategic</a:t>
+            </a:r>
+            <a:endParaRPr lang="en-US" sz="1200" b="1" dirty="0">
+              <a:latin typeface="Calibri" pitchFamily="34" charset="0"/>
+              <a:cs typeface="Calibri" pitchFamily="34" charset="0"/>
+            </a:endParaRPr>
+          </a:p>
+        </p:txBody>
+      </p:sp>
+      <p:sp>
+        <p:nvSpPr>
+          <p:cNvPr id="23" name="TextBox 22"/>
+          <p:cNvSpPr txBox="1"/>
+          <p:nvPr/>
+        </p:nvSpPr>
+        <p:spPr>
+          <a:xfrm>
+            <a:off x="1978152" y="4419600"/>
+            <a:ext cx="1360629" cy="276999"/>
+          </a:xfrm>
+          <a:prstGeom prst="rect">
+            <a:avLst/>
+          </a:prstGeom>
+          <a:noFill/>
+        </p:spPr>
+        <p:txBody>
+          <a:bodyPr wrap="none" rtlCol="0">
+            <a:spAutoFit/>
+          </a:bodyPr>
+          <a:lstStyle/>
+          <a:p>
+            <a:r>
+              <a:rPr lang="en-US" sz="1200" b="1" dirty="0" smtClean="0">
+                <a:latin typeface="Calibri" pitchFamily="34" charset="0"/>
+                <a:cs typeface="Calibri" pitchFamily="34" charset="0"/>
+              </a:rPr>
+              <a:t>Between-Episodes</a:t>
+            </a:r>
+            <a:endParaRPr lang="en-US" sz="1200" b="1" dirty="0">
+              <a:latin typeface="Calibri" pitchFamily="34" charset="0"/>
+              <a:cs typeface="Calibri" pitchFamily="34" charset="0"/>
+            </a:endParaRPr>
+          </a:p>
+        </p:txBody>
+      </p:sp>
+      <p:sp>
+        <p:nvSpPr>
+          <p:cNvPr id="24" name="TextBox 23"/>
+          <p:cNvSpPr txBox="1"/>
+          <p:nvPr/>
+        </p:nvSpPr>
+        <p:spPr>
+          <a:xfrm>
+            <a:off x="2511552" y="5029200"/>
+            <a:ext cx="1168910" cy="276999"/>
+          </a:xfrm>
+          <a:prstGeom prst="rect">
+            <a:avLst/>
+          </a:prstGeom>
+          <a:noFill/>
+        </p:spPr>
+        <p:txBody>
+          <a:bodyPr wrap="none" rtlCol="0">
+            <a:spAutoFit/>
+          </a:bodyPr>
+          <a:lstStyle/>
+          <a:p>
+            <a:r>
+              <a:rPr lang="en-US" sz="1200" b="1" dirty="0" smtClean="0">
+                <a:latin typeface="Calibri" pitchFamily="34" charset="0"/>
+                <a:cs typeface="Calibri" pitchFamily="34" charset="0"/>
+              </a:rPr>
+              <a:t>Within-Episode</a:t>
+            </a:r>
+            <a:endParaRPr lang="en-US" sz="1200" b="1" dirty="0">
+              <a:latin typeface="Calibri" pitchFamily="34" charset="0"/>
+              <a:cs typeface="Calibri" pitchFamily="34" charset="0"/>
+            </a:endParaRPr>
+          </a:p>
+        </p:txBody>
+      </p:sp>
+      <p:sp>
+        <p:nvSpPr>
+          <p:cNvPr id="25" name="TextBox 24"/>
+          <p:cNvSpPr txBox="1"/>
+          <p:nvPr/>
+        </p:nvSpPr>
+        <p:spPr>
+          <a:xfrm>
+            <a:off x="1520952" y="3200400"/>
+            <a:ext cx="1461490" cy="338554"/>
+          </a:xfrm>
+          <a:prstGeom prst="rect">
+            <a:avLst/>
+          </a:prstGeom>
+          <a:noFill/>
+        </p:spPr>
+        <p:txBody>
+          <a:bodyPr wrap="none" rtlCol="0">
+            <a:spAutoFit/>
+          </a:bodyPr>
+          <a:lstStyle/>
+          <a:p>
+            <a:r>
+              <a:rPr lang="en-US" sz="1600" b="1" dirty="0" smtClean="0">
+                <a:latin typeface="Calibri" pitchFamily="34" charset="0"/>
+                <a:cs typeface="Calibri" pitchFamily="34" charset="0"/>
+              </a:rPr>
+              <a:t>UAV for WiSAR</a:t>
+            </a:r>
+            <a:endParaRPr lang="en-US" sz="1600" b="1" dirty="0">
+              <a:latin typeface="Calibri" pitchFamily="34" charset="0"/>
+              <a:cs typeface="Calibri" pitchFamily="34" charset="0"/>
+            </a:endParaRPr>
+          </a:p>
+        </p:txBody>
+      </p:sp>
+      <p:sp>
+        <p:nvSpPr>
+          <p:cNvPr id="26" name="Left Arrow 25"/>
+          <p:cNvSpPr/>
+          <p:nvPr/>
+        </p:nvSpPr>
+        <p:spPr>
+          <a:xfrm>
+            <a:off x="5026152" y="5562600"/>
+            <a:ext cx="1676400" cy="484632"/>
+          </a:xfrm>
+          <a:prstGeom prst="leftArrow">
+            <a:avLst/>
+          </a:prstGeom>
+          <a:solidFill>
+            <a:srgbClr val="71FFB1"/>
+          </a:solidFill>
+          <a:ln>
+            <a:solidFill>
+              <a:schemeClr val="tx1"/>
+            </a:solidFill>
+            <a:prstDash val="lgDash"/>
+          </a:ln>
+        </p:spPr>
+        <p:style>
+          <a:lnRef idx="2">
+            <a:schemeClr val="accent1">
+              <a:shade val="50000"/>
+            </a:schemeClr>
+          </a:lnRef>
+          <a:fillRef idx="1">
+            <a:schemeClr val="accent1"/>
+          </a:fillRef>
+          <a:effectRef idx="0">
+            <a:schemeClr val="accent1"/>
+          </a:effectRef>
+          <a:fontRef idx="minor">
+            <a:schemeClr val="lt1"/>
+          </a:fontRef>
+        </p:style>
+        <p:txBody>
+          <a:bodyPr rtlCol="0" anchor="ctr"/>
+          <a:lstStyle/>
+          <a:p>
+            <a:pPr algn="ctr"/>
+            <a:r>
+              <a:rPr lang="en-US" dirty="0" smtClean="0">
+                <a:solidFill>
+                  <a:schemeClr val="tx1"/>
+                </a:solidFill>
+                <a:latin typeface="Calibri" pitchFamily="34" charset="0"/>
+                <a:cs typeface="Calibri" pitchFamily="34" charset="0"/>
+              </a:rPr>
+              <a:t>Information</a:t>
+            </a:r>
+            <a:endParaRPr lang="en-US" dirty="0">
+              <a:solidFill>
+                <a:schemeClr val="tx1"/>
+              </a:solidFill>
+              <a:latin typeface="Calibri" pitchFamily="34" charset="0"/>
+              <a:cs typeface="Calibri" pitchFamily="34" charset="0"/>
+            </a:endParaRPr>
+          </a:p>
+        </p:txBody>
+      </p:sp>
+      <p:sp>
+        <p:nvSpPr>
+          <p:cNvPr id="27" name="Left Arrow 26"/>
+          <p:cNvSpPr/>
+          <p:nvPr/>
+        </p:nvSpPr>
+        <p:spPr>
+          <a:xfrm>
+            <a:off x="5026152" y="4468368"/>
+            <a:ext cx="1676400" cy="484632"/>
+          </a:xfrm>
+          <a:prstGeom prst="leftArrow">
+            <a:avLst/>
+          </a:prstGeom>
+          <a:solidFill>
+            <a:srgbClr val="71FFB1"/>
+          </a:solidFill>
+          <a:ln>
+            <a:solidFill>
+              <a:schemeClr val="tx1"/>
+            </a:solidFill>
+            <a:prstDash val="lgDash"/>
+          </a:ln>
+        </p:spPr>
+        <p:style>
+          <a:lnRef idx="2">
+            <a:schemeClr val="accent1">
+              <a:shade val="50000"/>
+            </a:schemeClr>
+          </a:lnRef>
+          <a:fillRef idx="1">
+            <a:schemeClr val="accent1"/>
+          </a:fillRef>
+          <a:effectRef idx="0">
+            <a:schemeClr val="accent1"/>
+          </a:effectRef>
+          <a:fontRef idx="minor">
+            <a:schemeClr val="lt1"/>
+          </a:fontRef>
+        </p:style>
+        <p:txBody>
+          <a:bodyPr rtlCol="0" anchor="ctr"/>
+          <a:lstStyle/>
+          <a:p>
+            <a:pPr algn="ctr"/>
+            <a:r>
+              <a:rPr lang="en-US" dirty="0" smtClean="0">
+                <a:solidFill>
+                  <a:schemeClr val="tx1"/>
+                </a:solidFill>
+                <a:latin typeface="Calibri" pitchFamily="34" charset="0"/>
+                <a:cs typeface="Calibri" pitchFamily="34" charset="0"/>
+              </a:rPr>
+              <a:t>Information</a:t>
+            </a:r>
+            <a:endParaRPr lang="en-US" dirty="0">
+              <a:solidFill>
+                <a:schemeClr val="tx1"/>
+              </a:solidFill>
+              <a:latin typeface="Calibri" pitchFamily="34" charset="0"/>
+              <a:cs typeface="Calibri" pitchFamily="34" charset="0"/>
+            </a:endParaRPr>
+          </a:p>
+        </p:txBody>
+      </p:sp>
+      <p:sp>
+        <p:nvSpPr>
+          <p:cNvPr id="29" name="Left Arrow 28"/>
+          <p:cNvSpPr/>
+          <p:nvPr/>
+        </p:nvSpPr>
+        <p:spPr>
+          <a:xfrm>
+            <a:off x="5026152" y="3733800"/>
+            <a:ext cx="1676400" cy="484632"/>
+          </a:xfrm>
+          <a:prstGeom prst="leftArrow">
+            <a:avLst/>
+          </a:prstGeom>
+          <a:solidFill>
+            <a:srgbClr val="71FFB1"/>
+          </a:solidFill>
+          <a:ln>
+            <a:solidFill>
+              <a:schemeClr val="tx1"/>
+            </a:solidFill>
+            <a:prstDash val="lgDash"/>
+          </a:ln>
+        </p:spPr>
+        <p:style>
+          <a:lnRef idx="2">
+            <a:schemeClr val="accent1">
+              <a:shade val="50000"/>
+            </a:schemeClr>
+          </a:lnRef>
+          <a:fillRef idx="1">
+            <a:schemeClr val="accent1"/>
+          </a:fillRef>
+          <a:effectRef idx="0">
+            <a:schemeClr val="accent1"/>
+          </a:effectRef>
+          <a:fontRef idx="minor">
+            <a:schemeClr val="lt1"/>
+          </a:fontRef>
+        </p:style>
+        <p:txBody>
+          <a:bodyPr rtlCol="0" anchor="ctr"/>
+          <a:lstStyle/>
+          <a:p>
+            <a:pPr algn="ctr"/>
+            <a:r>
+              <a:rPr lang="en-US" dirty="0" smtClean="0">
+                <a:solidFill>
+                  <a:schemeClr val="tx1"/>
+                </a:solidFill>
+                <a:latin typeface="Calibri" pitchFamily="34" charset="0"/>
+                <a:cs typeface="Calibri" pitchFamily="34" charset="0"/>
+              </a:rPr>
+              <a:t>Information</a:t>
+            </a:r>
+            <a:endParaRPr lang="en-US" dirty="0">
+              <a:solidFill>
+                <a:schemeClr val="tx1"/>
+              </a:solidFill>
+              <a:latin typeface="Calibri" pitchFamily="34" charset="0"/>
+              <a:cs typeface="Calibri" pitchFamily="34" charset="0"/>
+            </a:endParaRPr>
+          </a:p>
+        </p:txBody>
+      </p:sp>
+      <p:pic>
+        <p:nvPicPr>
+          <p:cNvPr id="16" name="Picture 4" descr="UAV_transparent"/>
+          <p:cNvPicPr>
+            <a:picLocks noChangeAspect="1" noChangeArrowheads="1"/>
+          </p:cNvPicPr>
+          <p:nvPr/>
+        </p:nvPicPr>
+        <p:blipFill>
+          <a:blip r:embed="rId5" cstate="print"/>
+          <a:srcRect/>
+          <a:stretch>
+            <a:fillRect/>
+          </a:stretch>
+        </p:blipFill>
+        <p:spPr>
+          <a:xfrm>
+            <a:off x="2587752" y="5562600"/>
+            <a:ext cx="1066800" cy="281147"/>
+          </a:xfrm>
+          <a:prstGeom prst="rect">
+            <a:avLst/>
+          </a:prstGeom>
+          <a:noFill/>
+        </p:spPr>
+      </p:pic>
+      <p:pic>
+        <p:nvPicPr>
+          <p:cNvPr id="3074" name="Picture 2"/>
+          <p:cNvPicPr>
+            <a:picLocks noChangeAspect="1" noChangeArrowheads="1"/>
+          </p:cNvPicPr>
+          <p:nvPr/>
+        </p:nvPicPr>
+        <p:blipFill>
+          <a:blip r:embed="rId6" cstate="print"/>
+          <a:srcRect/>
+          <a:stretch>
+            <a:fillRect/>
+          </a:stretch>
+        </p:blipFill>
+        <p:spPr bwMode="auto">
+          <a:xfrm>
+            <a:off x="6781800" y="3505200"/>
+            <a:ext cx="2114550" cy="2819400"/>
+          </a:xfrm>
+          <a:prstGeom prst="ellipse">
+            <a:avLst/>
+          </a:prstGeom>
+          <a:ln>
+            <a:noFill/>
+          </a:ln>
+          <a:effectLst>
+            <a:softEdge rad="112500"/>
+          </a:effectLst>
+        </p:spPr>
+      </p:pic>
+      <p:cxnSp>
+        <p:nvCxnSpPr>
+          <p:cNvPr id="34" name="Straight Arrow Connector 33"/>
+          <p:cNvCxnSpPr>
+            <a:stCxn id="1027" idx="2"/>
+          </p:cNvCxnSpPr>
+          <p:nvPr/>
+        </p:nvCxnSpPr>
+        <p:spPr>
+          <a:xfrm rot="16200000" flipH="1">
+            <a:off x="3521376" y="3333923"/>
+            <a:ext cx="612301" cy="187452"/>
+          </a:xfrm>
+          <a:prstGeom prst="straightConnector1">
+            <a:avLst/>
+          </a:prstGeom>
+          <a:ln w="25400">
+            <a:solidFill>
+              <a:srgbClr val="6600FF"/>
+            </a:solidFill>
+            <a:tailEnd type="arrow"/>
+          </a:ln>
+        </p:spPr>
+        <p:style>
+          <a:lnRef idx="1">
+            <a:schemeClr val="accent1"/>
+          </a:lnRef>
+          <a:fillRef idx="0">
+            <a:schemeClr val="accent1"/>
+          </a:fillRef>
+          <a:effectRef idx="0">
+            <a:schemeClr val="accent1"/>
+          </a:effectRef>
+          <a:fontRef idx="minor">
+            <a:schemeClr val="tx1"/>
+          </a:fontRef>
+        </p:style>
+      </p:cxnSp>
+      <p:cxnSp>
+        <p:nvCxnSpPr>
+          <p:cNvPr id="35" name="Straight Arrow Connector 34"/>
+          <p:cNvCxnSpPr>
+            <a:stCxn id="1026" idx="2"/>
+          </p:cNvCxnSpPr>
+          <p:nvPr/>
+        </p:nvCxnSpPr>
+        <p:spPr>
+          <a:xfrm rot="5400000">
+            <a:off x="4359769" y="3216768"/>
+            <a:ext cx="611915" cy="422148"/>
+          </a:xfrm>
+          <a:prstGeom prst="straightConnector1">
+            <a:avLst/>
+          </a:prstGeom>
+          <a:ln w="25400">
+            <a:solidFill>
+              <a:srgbClr val="6600FF"/>
+            </a:solidFill>
+            <a:tailEnd type="arrow"/>
+          </a:ln>
+        </p:spPr>
+        <p:style>
+          <a:lnRef idx="1">
+            <a:schemeClr val="accent1"/>
+          </a:lnRef>
+          <a:fillRef idx="0">
+            <a:schemeClr val="accent1"/>
+          </a:fillRef>
+          <a:effectRef idx="0">
+            <a:schemeClr val="accent1"/>
+          </a:effectRef>
+          <a:fontRef idx="minor">
+            <a:schemeClr val="tx1"/>
+          </a:fontRef>
+        </p:style>
+      </p:cxnSp>
+      <p:sp>
+        <p:nvSpPr>
+          <p:cNvPr id="30" name="TextBox 29"/>
+          <p:cNvSpPr txBox="1"/>
+          <p:nvPr/>
+        </p:nvSpPr>
+        <p:spPr>
+          <a:xfrm>
+            <a:off x="1828800" y="2362200"/>
+            <a:ext cx="1447800" cy="523220"/>
+          </a:xfrm>
+          <a:prstGeom prst="rect">
+            <a:avLst/>
+          </a:prstGeom>
+          <a:noFill/>
+        </p:spPr>
+        <p:txBody>
+          <a:bodyPr wrap="square" rtlCol="0">
+            <a:spAutoFit/>
+          </a:bodyPr>
+          <a:lstStyle/>
+          <a:p>
+            <a:pPr algn="ctr"/>
+            <a:r>
+              <a:rPr lang="en-US" sz="1400" dirty="0" smtClean="0">
+                <a:solidFill>
+                  <a:srgbClr val="6600FF"/>
+                </a:solidFill>
+              </a:rPr>
+              <a:t>Probability Distribution Map</a:t>
+            </a:r>
+            <a:endParaRPr lang="en-US" sz="1400" dirty="0">
+              <a:solidFill>
+                <a:srgbClr val="6600FF"/>
+              </a:solidFill>
+            </a:endParaRPr>
+          </a:p>
+        </p:txBody>
+      </p:sp>
+      <p:sp>
+        <p:nvSpPr>
+          <p:cNvPr id="31" name="Rectangle 30"/>
+          <p:cNvSpPr/>
+          <p:nvPr/>
+        </p:nvSpPr>
+        <p:spPr>
+          <a:xfrm>
+            <a:off x="3733800" y="3733800"/>
+            <a:ext cx="381000" cy="2362200"/>
+          </a:xfrm>
+          <a:prstGeom prst="rect">
+            <a:avLst/>
+          </a:prstGeom>
+          <a:solidFill>
+            <a:srgbClr val="C3D69B"/>
+          </a:solidFill>
+          <a:ln>
+            <a:solidFill>
+              <a:schemeClr val="tx1"/>
+            </a:solidFill>
+          </a:ln>
+        </p:spPr>
+        <p:style>
+          <a:lnRef idx="2">
+            <a:schemeClr val="accent1">
+              <a:shade val="50000"/>
+            </a:schemeClr>
+          </a:lnRef>
+          <a:fillRef idx="1">
+            <a:schemeClr val="accent1"/>
+          </a:fillRef>
+          <a:effectRef idx="0">
+            <a:schemeClr val="accent1"/>
+          </a:effectRef>
+          <a:fontRef idx="minor">
+            <a:schemeClr val="lt1"/>
+          </a:fontRef>
+        </p:style>
+        <p:txBody>
+          <a:bodyPr vert="vert270" rtlCol="0" anchor="ctr"/>
+          <a:lstStyle>
+            <a:defPPr>
+              <a:defRPr lang="en-US"/>
+            </a:defPPr>
+            <a:lvl1pPr marL="0" algn="l" defTabSz="914400" rtl="0" eaLnBrk="1" latinLnBrk="0" hangingPunct="1">
+              <a:defRPr sz="1800" kern="1200">
+                <a:solidFill>
+                  <a:schemeClr val="lt1"/>
+                </a:solidFill>
+                <a:latin typeface="+mn-lt"/>
+                <a:ea typeface="+mn-ea"/>
+                <a:cs typeface="+mn-cs"/>
+              </a:defRPr>
+            </a:lvl1pPr>
+            <a:lvl2pPr marL="457200" algn="l" defTabSz="914400" rtl="0" eaLnBrk="1" latinLnBrk="0" hangingPunct="1">
+              <a:defRPr sz="1800" kern="1200">
+                <a:solidFill>
+                  <a:schemeClr val="lt1"/>
+                </a:solidFill>
+                <a:latin typeface="+mn-lt"/>
+                <a:ea typeface="+mn-ea"/>
+                <a:cs typeface="+mn-cs"/>
+              </a:defRPr>
+            </a:lvl2pPr>
+            <a:lvl3pPr marL="914400" algn="l" defTabSz="914400" rtl="0" eaLnBrk="1" latinLnBrk="0" hangingPunct="1">
+              <a:defRPr sz="1800" kern="1200">
+                <a:solidFill>
+                  <a:schemeClr val="lt1"/>
+                </a:solidFill>
+                <a:latin typeface="+mn-lt"/>
+                <a:ea typeface="+mn-ea"/>
+                <a:cs typeface="+mn-cs"/>
+              </a:defRPr>
+            </a:lvl3pPr>
+            <a:lvl4pPr marL="1371600" algn="l" defTabSz="914400" rtl="0" eaLnBrk="1" latinLnBrk="0" hangingPunct="1">
+              <a:defRPr sz="1800" kern="1200">
+                <a:solidFill>
+                  <a:schemeClr val="lt1"/>
+                </a:solidFill>
+                <a:latin typeface="+mn-lt"/>
+                <a:ea typeface="+mn-ea"/>
+                <a:cs typeface="+mn-cs"/>
+              </a:defRPr>
+            </a:lvl4pPr>
+            <a:lvl5pPr marL="1828800" algn="l" defTabSz="914400" rtl="0" eaLnBrk="1" latinLnBrk="0" hangingPunct="1">
+              <a:defRPr sz="1800" kern="1200">
+                <a:solidFill>
+                  <a:schemeClr val="lt1"/>
+                </a:solidFill>
+                <a:latin typeface="+mn-lt"/>
+                <a:ea typeface="+mn-ea"/>
+                <a:cs typeface="+mn-cs"/>
+              </a:defRPr>
+            </a:lvl5pPr>
+            <a:lvl6pPr marL="2286000" algn="l" defTabSz="914400" rtl="0" eaLnBrk="1" latinLnBrk="0" hangingPunct="1">
+              <a:defRPr sz="1800" kern="1200">
+                <a:solidFill>
+                  <a:schemeClr val="lt1"/>
+                </a:solidFill>
+                <a:latin typeface="+mn-lt"/>
+                <a:ea typeface="+mn-ea"/>
+                <a:cs typeface="+mn-cs"/>
+              </a:defRPr>
+            </a:lvl6pPr>
+            <a:lvl7pPr marL="2743200" algn="l" defTabSz="914400" rtl="0" eaLnBrk="1" latinLnBrk="0" hangingPunct="1">
+              <a:defRPr sz="1800" kern="1200">
+                <a:solidFill>
+                  <a:schemeClr val="lt1"/>
+                </a:solidFill>
+                <a:latin typeface="+mn-lt"/>
+                <a:ea typeface="+mn-ea"/>
+                <a:cs typeface="+mn-cs"/>
+              </a:defRPr>
+            </a:lvl7pPr>
+            <a:lvl8pPr marL="3200400" algn="l" defTabSz="914400" rtl="0" eaLnBrk="1" latinLnBrk="0" hangingPunct="1">
+              <a:defRPr sz="1800" kern="1200">
+                <a:solidFill>
+                  <a:schemeClr val="lt1"/>
+                </a:solidFill>
+                <a:latin typeface="+mn-lt"/>
+                <a:ea typeface="+mn-ea"/>
+                <a:cs typeface="+mn-cs"/>
+              </a:defRPr>
+            </a:lvl8pPr>
+            <a:lvl9pPr marL="3657600" algn="l" defTabSz="914400" rtl="0" eaLnBrk="1" latinLnBrk="0" hangingPunct="1">
+              <a:defRPr sz="1800" kern="1200">
+                <a:solidFill>
+                  <a:schemeClr val="lt1"/>
+                </a:solidFill>
+                <a:latin typeface="+mn-lt"/>
+                <a:ea typeface="+mn-ea"/>
+                <a:cs typeface="+mn-cs"/>
+              </a:defRPr>
+            </a:lvl9pPr>
+          </a:lstStyle>
+          <a:p>
+            <a:pPr algn="ctr"/>
+            <a:r>
+              <a:rPr lang="en-US" dirty="0" smtClean="0">
+                <a:solidFill>
+                  <a:schemeClr val="tx1"/>
+                </a:solidFill>
+                <a:latin typeface="Calibri" pitchFamily="34" charset="0"/>
+                <a:cs typeface="Calibri" pitchFamily="34" charset="0"/>
+              </a:rPr>
+              <a:t>Areas of Focus</a:t>
+            </a:r>
+            <a:endParaRPr lang="en-US" dirty="0">
+              <a:solidFill>
+                <a:schemeClr val="tx1"/>
+              </a:solidFill>
+              <a:latin typeface="Calibri" pitchFamily="34" charset="0"/>
+              <a:cs typeface="Calibri" pitchFamily="34" charset="0"/>
+            </a:endParaRPr>
+          </a:p>
+        </p:txBody>
+      </p:sp>
+      <p:sp>
+        <p:nvSpPr>
+          <p:cNvPr id="33" name="Rectangle 32"/>
+          <p:cNvSpPr/>
+          <p:nvPr/>
+        </p:nvSpPr>
+        <p:spPr>
+          <a:xfrm>
+            <a:off x="4267200" y="3733800"/>
+            <a:ext cx="381000" cy="2362200"/>
+          </a:xfrm>
+          <a:prstGeom prst="rect">
+            <a:avLst/>
+          </a:prstGeom>
+          <a:solidFill>
+            <a:srgbClr val="00B0F0"/>
+          </a:solidFill>
+          <a:ln>
+            <a:solidFill>
+              <a:schemeClr val="tx1"/>
+            </a:solidFill>
+          </a:ln>
+        </p:spPr>
+        <p:style>
+          <a:lnRef idx="2">
+            <a:schemeClr val="accent1">
+              <a:shade val="50000"/>
+            </a:schemeClr>
+          </a:lnRef>
+          <a:fillRef idx="1">
+            <a:schemeClr val="accent1"/>
+          </a:fillRef>
+          <a:effectRef idx="0">
+            <a:schemeClr val="accent1"/>
+          </a:effectRef>
+          <a:fontRef idx="minor">
+            <a:schemeClr val="lt1"/>
+          </a:fontRef>
+        </p:style>
+        <p:txBody>
+          <a:bodyPr vert="vert270" rtlCol="0" anchor="ctr"/>
+          <a:lstStyle>
+            <a:defPPr>
+              <a:defRPr lang="en-US"/>
+            </a:defPPr>
+            <a:lvl1pPr marL="0" algn="l" defTabSz="914400" rtl="0" eaLnBrk="1" latinLnBrk="0" hangingPunct="1">
+              <a:defRPr sz="1800" kern="1200">
+                <a:solidFill>
+                  <a:schemeClr val="lt1"/>
+                </a:solidFill>
+                <a:latin typeface="+mn-lt"/>
+                <a:ea typeface="+mn-ea"/>
+                <a:cs typeface="+mn-cs"/>
+              </a:defRPr>
+            </a:lvl1pPr>
+            <a:lvl2pPr marL="457200" algn="l" defTabSz="914400" rtl="0" eaLnBrk="1" latinLnBrk="0" hangingPunct="1">
+              <a:defRPr sz="1800" kern="1200">
+                <a:solidFill>
+                  <a:schemeClr val="lt1"/>
+                </a:solidFill>
+                <a:latin typeface="+mn-lt"/>
+                <a:ea typeface="+mn-ea"/>
+                <a:cs typeface="+mn-cs"/>
+              </a:defRPr>
+            </a:lvl2pPr>
+            <a:lvl3pPr marL="914400" algn="l" defTabSz="914400" rtl="0" eaLnBrk="1" latinLnBrk="0" hangingPunct="1">
+              <a:defRPr sz="1800" kern="1200">
+                <a:solidFill>
+                  <a:schemeClr val="lt1"/>
+                </a:solidFill>
+                <a:latin typeface="+mn-lt"/>
+                <a:ea typeface="+mn-ea"/>
+                <a:cs typeface="+mn-cs"/>
+              </a:defRPr>
+            </a:lvl3pPr>
+            <a:lvl4pPr marL="1371600" algn="l" defTabSz="914400" rtl="0" eaLnBrk="1" latinLnBrk="0" hangingPunct="1">
+              <a:defRPr sz="1800" kern="1200">
+                <a:solidFill>
+                  <a:schemeClr val="lt1"/>
+                </a:solidFill>
+                <a:latin typeface="+mn-lt"/>
+                <a:ea typeface="+mn-ea"/>
+                <a:cs typeface="+mn-cs"/>
+              </a:defRPr>
+            </a:lvl4pPr>
+            <a:lvl5pPr marL="1828800" algn="l" defTabSz="914400" rtl="0" eaLnBrk="1" latinLnBrk="0" hangingPunct="1">
+              <a:defRPr sz="1800" kern="1200">
+                <a:solidFill>
+                  <a:schemeClr val="lt1"/>
+                </a:solidFill>
+                <a:latin typeface="+mn-lt"/>
+                <a:ea typeface="+mn-ea"/>
+                <a:cs typeface="+mn-cs"/>
+              </a:defRPr>
+            </a:lvl5pPr>
+            <a:lvl6pPr marL="2286000" algn="l" defTabSz="914400" rtl="0" eaLnBrk="1" latinLnBrk="0" hangingPunct="1">
+              <a:defRPr sz="1800" kern="1200">
+                <a:solidFill>
+                  <a:schemeClr val="lt1"/>
+                </a:solidFill>
+                <a:latin typeface="+mn-lt"/>
+                <a:ea typeface="+mn-ea"/>
+                <a:cs typeface="+mn-cs"/>
+              </a:defRPr>
+            </a:lvl6pPr>
+            <a:lvl7pPr marL="2743200" algn="l" defTabSz="914400" rtl="0" eaLnBrk="1" latinLnBrk="0" hangingPunct="1">
+              <a:defRPr sz="1800" kern="1200">
+                <a:solidFill>
+                  <a:schemeClr val="lt1"/>
+                </a:solidFill>
+                <a:latin typeface="+mn-lt"/>
+                <a:ea typeface="+mn-ea"/>
+                <a:cs typeface="+mn-cs"/>
+              </a:defRPr>
+            </a:lvl7pPr>
+            <a:lvl8pPr marL="3200400" algn="l" defTabSz="914400" rtl="0" eaLnBrk="1" latinLnBrk="0" hangingPunct="1">
+              <a:defRPr sz="1800" kern="1200">
+                <a:solidFill>
+                  <a:schemeClr val="lt1"/>
+                </a:solidFill>
+                <a:latin typeface="+mn-lt"/>
+                <a:ea typeface="+mn-ea"/>
+                <a:cs typeface="+mn-cs"/>
+              </a:defRPr>
+            </a:lvl8pPr>
+            <a:lvl9pPr marL="3657600" algn="l" defTabSz="914400" rtl="0" eaLnBrk="1" latinLnBrk="0" hangingPunct="1">
+              <a:defRPr sz="1800" kern="1200">
+                <a:solidFill>
+                  <a:schemeClr val="lt1"/>
+                </a:solidFill>
+                <a:latin typeface="+mn-lt"/>
+                <a:ea typeface="+mn-ea"/>
+                <a:cs typeface="+mn-cs"/>
+              </a:defRPr>
+            </a:lvl9pPr>
+          </a:lstStyle>
+          <a:p>
+            <a:pPr algn="ctr"/>
+            <a:r>
+              <a:rPr lang="en-US" dirty="0" smtClean="0">
+                <a:solidFill>
+                  <a:schemeClr val="tx1"/>
+                </a:solidFill>
+                <a:latin typeface="Calibri" pitchFamily="34" charset="0"/>
+                <a:cs typeface="Calibri" pitchFamily="34" charset="0"/>
+              </a:rPr>
+              <a:t>Task Difficulty</a:t>
+            </a:r>
+            <a:endParaRPr lang="en-US" dirty="0">
+              <a:solidFill>
+                <a:schemeClr val="tx1"/>
+              </a:solidFill>
+              <a:latin typeface="Calibri" pitchFamily="34" charset="0"/>
+              <a:cs typeface="Calibri" pitchFamily="34" charset="0"/>
+            </a:endParaRPr>
+          </a:p>
+        </p:txBody>
+      </p:sp>
+      <p:sp>
+        <p:nvSpPr>
+          <p:cNvPr id="36" name="TextBox 35"/>
+          <p:cNvSpPr txBox="1"/>
+          <p:nvPr/>
+        </p:nvSpPr>
+        <p:spPr>
+          <a:xfrm>
+            <a:off x="5257800" y="2362200"/>
+            <a:ext cx="1219200" cy="523220"/>
+          </a:xfrm>
+          <a:prstGeom prst="rect">
+            <a:avLst/>
+          </a:prstGeom>
+          <a:noFill/>
+        </p:spPr>
+        <p:txBody>
+          <a:bodyPr wrap="square" rtlCol="0">
+            <a:spAutoFit/>
+          </a:bodyPr>
+          <a:lstStyle/>
+          <a:p>
+            <a:pPr algn="ctr"/>
+            <a:r>
+              <a:rPr lang="en-US" sz="1400" dirty="0" smtClean="0">
+                <a:solidFill>
+                  <a:srgbClr val="6600FF"/>
+                </a:solidFill>
+              </a:rPr>
+              <a:t>Task-Difficulty Map</a:t>
+            </a:r>
+            <a:endParaRPr lang="en-US" sz="1400" dirty="0">
+              <a:solidFill>
+                <a:srgbClr val="6600FF"/>
+              </a:solidFill>
+            </a:endParaRPr>
+          </a:p>
+        </p:txBody>
+      </p:sp>
+    </p:spTree>
+    <p:extLst>
+      <p:ext uri="{BB962C8B-B14F-4D97-AF65-F5344CB8AC3E}">
+        <p14:creationId xmlns:p14="http://schemas.microsoft.com/office/powerpoint/2010/main" val="677974064"/>
+      </p:ext>
+    </p:extLst>
+  </p:cSld>
+  <p:clrMapOvr>
+    <a:masterClrMapping/>
+  </p:clrMapOvr>
+  <mc:AlternateContent xmlns:mc="http://schemas.openxmlformats.org/markup-compatibility/2006">
+    <mc:Choice xmlns:p14="http://schemas.microsoft.com/office/powerpoint/2010/main" Requires="p14">
+      <p:transition spd="slow" p14:dur="2000"/>
+    </mc:Choice>
+    <mc:Fallback>
+      <p:transition spd="slow"/>
+    </mc:Fallback>
+  </mc:AlternateContent>
+  <p:timing>
+    <p:tnLst>
+      <p:par>
+        <p:cTn id="1" dur="indefinite" restart="never" nodeType="tmRoot">
+          <p:childTnLst>
+            <p:seq concurrent="1" nextAc="seek">
+              <p:cTn id="2" dur="indefinite" nodeType="mainSeq">
+                <p:childTnLst>
+                  <p:par>
+                    <p:cTn id="3" fill="hold">
+                      <p:stCondLst>
+                        <p:cond delay="indefinite"/>
+                        <p:cond evt="onBegin" delay="0">
+                          <p:tn val="2"/>
+                        </p:cond>
+                      </p:stCondLst>
+                      <p:childTnLst>
+                        <p:par>
+                          <p:cTn id="4" fill="hold">
+                            <p:stCondLst>
+                              <p:cond delay="0"/>
+                            </p:stCondLst>
+                            <p:childTnLst>
+                              <p:par>
+                                <p:cTn id="5" presetID="2" presetClass="entr" presetSubtype="4" fill="hold" nodeType="withEffect">
+                                  <p:stCondLst>
+                                    <p:cond delay="0"/>
+                                  </p:stCondLst>
+                                  <p:childTnLst>
+                                    <p:set>
+                                      <p:cBhvr>
+                                        <p:cTn id="6" dur="1" fill="hold">
+                                          <p:stCondLst>
+                                            <p:cond delay="0"/>
+                                          </p:stCondLst>
+                                        </p:cTn>
+                                        <p:tgtEl>
+                                          <p:spTgt spid="16"/>
+                                        </p:tgtEl>
+                                        <p:attrNameLst>
+                                          <p:attrName>style.visibility</p:attrName>
+                                        </p:attrNameLst>
+                                      </p:cBhvr>
+                                      <p:to>
+                                        <p:strVal val="visible"/>
+                                      </p:to>
+                                    </p:set>
+                                    <p:anim calcmode="lin" valueType="num">
+                                      <p:cBhvr additive="base">
+                                        <p:cTn id="7" dur="500" fill="hold"/>
+                                        <p:tgtEl>
+                                          <p:spTgt spid="16"/>
+                                        </p:tgtEl>
+                                        <p:attrNameLst>
+                                          <p:attrName>ppt_x</p:attrName>
+                                        </p:attrNameLst>
+                                      </p:cBhvr>
+                                      <p:tavLst>
+                                        <p:tav tm="0">
+                                          <p:val>
+                                            <p:strVal val="#ppt_x"/>
+                                          </p:val>
+                                        </p:tav>
+                                        <p:tav tm="100000">
+                                          <p:val>
+                                            <p:strVal val="#ppt_x"/>
+                                          </p:val>
+                                        </p:tav>
+                                      </p:tavLst>
+                                    </p:anim>
+                                    <p:anim calcmode="lin" valueType="num">
+                                      <p:cBhvr additive="base">
+                                        <p:cTn id="8" dur="500" fill="hold"/>
+                                        <p:tgtEl>
+                                          <p:spTgt spid="16"/>
+                                        </p:tgtEl>
+                                        <p:attrNameLst>
+                                          <p:attrName>ppt_y</p:attrName>
+                                        </p:attrNameLst>
+                                      </p:cBhvr>
+                                      <p:tavLst>
+                                        <p:tav tm="0">
+                                          <p:val>
+                                            <p:strVal val="1+#ppt_h/2"/>
+                                          </p:val>
+                                        </p:tav>
+                                        <p:tav tm="100000">
+                                          <p:val>
+                                            <p:strVal val="#ppt_y"/>
+                                          </p:val>
+                                        </p:tav>
+                                      </p:tavLst>
+                                    </p:anim>
+                                  </p:childTnLst>
+                                </p:cTn>
+                              </p:par>
+                            </p:childTnLst>
+                          </p:cTn>
+                        </p:par>
+                      </p:childTnLst>
+                    </p:cTn>
+                  </p:par>
+                </p:childTnLst>
+              </p:cTn>
+              <p:prevCondLst>
+                <p:cond evt="onPrev" delay="0">
+                  <p:tgtEl>
+                    <p:sldTgt/>
+                  </p:tgtEl>
+                </p:cond>
+              </p:prevCondLst>
+              <p:nextCondLst>
+                <p:cond evt="onNext" delay="0">
+                  <p:tgtEl>
+                    <p:sldTgt/>
+                  </p:tgtEl>
+                </p:cond>
+              </p:nextCondLst>
+            </p:seq>
+          </p:childTnLst>
+        </p:cTn>
+      </p:par>
+    </p:tnLst>
+  </p:timing>
+</p:sld>
+</file>
+
+<file path=ppt/slides/slide4.xml><?xml version="1.0" encoding="utf-8"?>
+<p:sld xmlns:a="http://schemas.openxmlformats.org/drawingml/2006/main" xmlns:r="http://schemas.openxmlformats.org/officeDocument/2006/relationships" xmlns:p="http://schemas.openxmlformats.org/presentationml/2006/main">
+  <p:cSld>
+    <p:spTree>
+      <p:nvGrpSpPr>
+        <p:cNvPr id="1" name=""/>
+        <p:cNvGrpSpPr/>
+        <p:nvPr/>
+      </p:nvGrpSpPr>
+      <p:grpSpPr>
+        <a:xfrm>
+          <a:off x="0" y="0"/>
+          <a:ext cx="0" cy="0"/>
+          <a:chOff x="0" y="0"/>
+          <a:chExt cx="0" cy="0"/>
+        </a:xfrm>
+      </p:grpSpPr>
+      <p:sp>
+        <p:nvSpPr>
+          <p:cNvPr id="6" name="Title 1"/>
+          <p:cNvSpPr>
+            <a:spLocks noGrp="1"/>
+          </p:cNvSpPr>
+          <p:nvPr>
+            <p:ph type="title"/>
+          </p:nvPr>
+        </p:nvSpPr>
+        <p:spPr>
+          <a:xfrm>
+            <a:off x="1066800" y="274638"/>
+            <a:ext cx="7866888" cy="563562"/>
+          </a:xfrm>
+        </p:spPr>
+        <p:txBody>
+          <a:bodyPr>
+            <a:normAutofit/>
+          </a:bodyPr>
+          <a:lstStyle/>
+          <a:p>
+            <a:r>
+              <a:rPr lang="en-US" sz="2800" dirty="0" smtClean="0">
+                <a:latin typeface="Arial Narrow" pitchFamily="34" charset="0"/>
+              </a:rPr>
+              <a:t>Research Area – Managing Autonomy</a:t>
+            </a:r>
+            <a:endParaRPr lang="en-US" sz="2800" dirty="0">
+              <a:latin typeface="Arial Narrow" pitchFamily="34" charset="0"/>
+            </a:endParaRPr>
+          </a:p>
+        </p:txBody>
+      </p:sp>
+      <p:sp>
+        <p:nvSpPr>
+          <p:cNvPr id="7" name="Content Placeholder 2"/>
+          <p:cNvSpPr>
+            <a:spLocks noGrp="1"/>
+          </p:cNvSpPr>
+          <p:nvPr>
+            <p:ph idx="1"/>
+          </p:nvPr>
+        </p:nvSpPr>
+        <p:spPr>
+          <a:xfrm>
+            <a:off x="990600" y="914400"/>
+            <a:ext cx="8153400" cy="5943600"/>
+          </a:xfrm>
+        </p:spPr>
+        <p:txBody>
+          <a:bodyPr>
+            <a:normAutofit/>
+          </a:bodyPr>
+          <a:lstStyle/>
+          <a:p>
+            <a:r>
+              <a:rPr lang="en-US" sz="2000" dirty="0" smtClean="0">
+                <a:latin typeface="Arial Narrow" pitchFamily="34" charset="0"/>
+              </a:rPr>
+              <a:t>J. Scholtz (1992</a:t>
+            </a:r>
+            <a:r>
+              <a:rPr lang="en-US" sz="2000" dirty="0" smtClean="0">
+                <a:latin typeface="Arial Narrow" pitchFamily="34" charset="0"/>
+              </a:rPr>
+              <a:t>) Theory and evaluation of human robot interactions</a:t>
+            </a:r>
+            <a:endParaRPr lang="en-US" sz="2000" b="1" dirty="0" smtClean="0">
+              <a:solidFill>
+                <a:srgbClr val="6600FF"/>
+              </a:solidFill>
+              <a:latin typeface="Arial Narrow" pitchFamily="34" charset="0"/>
+            </a:endParaRPr>
+          </a:p>
+          <a:p>
+            <a:pPr lvl="1"/>
+            <a:r>
+              <a:rPr lang="en-US" sz="1600" b="1" dirty="0" smtClean="0">
+                <a:solidFill>
+                  <a:srgbClr val="6600FF"/>
+                </a:solidFill>
+                <a:latin typeface="Arial Narrow" pitchFamily="34" charset="0"/>
+              </a:rPr>
+              <a:t>Taxonomy of HRI roles</a:t>
+            </a:r>
+            <a:r>
+              <a:rPr lang="en-US" sz="1600" dirty="0" smtClean="0">
+                <a:latin typeface="Arial Narrow" pitchFamily="34" charset="0"/>
+              </a:rPr>
+              <a:t>:</a:t>
+            </a:r>
+          </a:p>
+          <a:p>
+            <a:pPr lvl="2"/>
+            <a:r>
+              <a:rPr lang="en-US" sz="1600" dirty="0" smtClean="0">
+                <a:latin typeface="Arial Narrow" pitchFamily="34" charset="0"/>
+              </a:rPr>
+              <a:t>Supervisor</a:t>
+            </a:r>
+          </a:p>
+          <a:p>
+            <a:pPr lvl="2"/>
+            <a:r>
+              <a:rPr lang="en-US" sz="1600" dirty="0" smtClean="0">
+                <a:latin typeface="Arial Narrow" pitchFamily="34" charset="0"/>
+              </a:rPr>
+              <a:t>Operator</a:t>
+            </a:r>
+          </a:p>
+          <a:p>
+            <a:pPr lvl="2"/>
+            <a:r>
+              <a:rPr lang="en-US" sz="1600" dirty="0" smtClean="0">
+                <a:latin typeface="Arial Narrow" pitchFamily="34" charset="0"/>
+              </a:rPr>
+              <a:t>Mechanic</a:t>
+            </a:r>
+          </a:p>
+          <a:p>
+            <a:pPr lvl="2"/>
+            <a:r>
+              <a:rPr lang="en-US" sz="1600" dirty="0" smtClean="0">
+                <a:latin typeface="Arial Narrow" pitchFamily="34" charset="0"/>
+              </a:rPr>
+              <a:t>Peer</a:t>
+            </a:r>
+          </a:p>
+          <a:p>
+            <a:pPr lvl="2"/>
+            <a:r>
+              <a:rPr lang="en-US" sz="1600" dirty="0" smtClean="0">
+                <a:latin typeface="Arial Narrow" pitchFamily="34" charset="0"/>
+              </a:rPr>
+              <a:t>Bystander</a:t>
+            </a:r>
+          </a:p>
+          <a:p>
+            <a:endParaRPr lang="en-US" sz="2100" dirty="0" smtClean="0">
+              <a:latin typeface="Arial Narrow" pitchFamily="34" charset="0"/>
+            </a:endParaRPr>
+          </a:p>
+          <a:p>
+            <a:r>
+              <a:rPr lang="en-US" sz="2000" dirty="0" smtClean="0">
+                <a:latin typeface="Arial Narrow" pitchFamily="34" charset="0"/>
+              </a:rPr>
+              <a:t>M. A. Goodrich &amp; A. C. Schultz (2007) Human-robot interaction: a survey</a:t>
+            </a:r>
+          </a:p>
+          <a:p>
+            <a:pPr lvl="1"/>
+            <a:r>
+              <a:rPr lang="en-US" sz="1600" dirty="0" smtClean="0">
+                <a:latin typeface="Arial Narrow" pitchFamily="34" charset="0"/>
+              </a:rPr>
+              <a:t>Added two roles:</a:t>
+            </a:r>
+          </a:p>
+          <a:p>
+            <a:pPr lvl="2"/>
+            <a:r>
+              <a:rPr lang="en-US" sz="1600" dirty="0" smtClean="0">
+                <a:latin typeface="Arial Narrow" pitchFamily="34" charset="0"/>
+              </a:rPr>
+              <a:t>Mentor</a:t>
+            </a:r>
+          </a:p>
+          <a:p>
+            <a:pPr lvl="2"/>
+            <a:r>
+              <a:rPr lang="en-US" sz="1600" dirty="0" smtClean="0">
+                <a:latin typeface="Arial Narrow" pitchFamily="34" charset="0"/>
+              </a:rPr>
+              <a:t>Information Consumer</a:t>
+            </a:r>
+          </a:p>
+          <a:p>
+            <a:endParaRPr lang="en-US" sz="2400" dirty="0" smtClean="0">
+              <a:latin typeface="Arial Narrow" pitchFamily="34" charset="0"/>
+            </a:endParaRPr>
+          </a:p>
+          <a:p>
+            <a:r>
+              <a:rPr lang="en-US" sz="2000" dirty="0" smtClean="0">
+                <a:latin typeface="Arial Narrow" pitchFamily="34" charset="0"/>
+              </a:rPr>
+              <a:t>C. M. Humphrey &amp; J. A. Adams (2009) Information abstraction visualization for human-robot interaction.</a:t>
+            </a:r>
+          </a:p>
+          <a:p>
+            <a:pPr lvl="1"/>
+            <a:r>
+              <a:rPr lang="en-US" sz="1600" dirty="0" smtClean="0">
+                <a:latin typeface="Arial Narrow" pitchFamily="34" charset="0"/>
+              </a:rPr>
+              <a:t>Added another role:</a:t>
+            </a:r>
+          </a:p>
+          <a:p>
+            <a:pPr lvl="2"/>
+            <a:r>
+              <a:rPr lang="en-US" sz="1600" dirty="0" smtClean="0">
+                <a:latin typeface="Arial Narrow" pitchFamily="34" charset="0"/>
+              </a:rPr>
+              <a:t>Abstract Supervisor</a:t>
+            </a:r>
+            <a:endParaRPr lang="en-US" sz="1700" dirty="0" smtClean="0">
+              <a:latin typeface="Arial Narrow" pitchFamily="34" charset="0"/>
+            </a:endParaRPr>
+          </a:p>
+        </p:txBody>
+      </p:sp>
+      <p:sp>
+        <p:nvSpPr>
+          <p:cNvPr id="8" name="Slide Number Placeholder 3"/>
+          <p:cNvSpPr>
+            <a:spLocks noGrp="1"/>
+          </p:cNvSpPr>
+          <p:nvPr>
+            <p:ph type="sldNum" sz="quarter" idx="12"/>
+          </p:nvPr>
+        </p:nvSpPr>
+        <p:spPr>
+          <a:xfrm>
+            <a:off x="8613648" y="6305550"/>
+            <a:ext cx="457200" cy="476250"/>
+          </a:xfrm>
+        </p:spPr>
+        <p:txBody>
+          <a:bodyPr/>
+          <a:lstStyle/>
+          <a:p>
+            <a:fld id="{80BAA4AE-BA16-457B-8F87-F96B0CF5E51B}" type="slidenum">
+              <a:rPr lang="en-US" smtClean="0"/>
+              <a:pPr/>
+              <a:t>4</a:t>
+            </a:fld>
+            <a:endParaRPr lang="en-US" dirty="0"/>
+          </a:p>
+        </p:txBody>
+      </p:sp>
+      <p:sp>
+        <p:nvSpPr>
+          <p:cNvPr id="9" name="Rectangle 8"/>
+          <p:cNvSpPr/>
+          <p:nvPr/>
+        </p:nvSpPr>
+        <p:spPr>
+          <a:xfrm>
+            <a:off x="1219200" y="868362"/>
+            <a:ext cx="7620000" cy="45719"/>
+          </a:xfrm>
+          <a:prstGeom prst="rect">
+            <a:avLst/>
+          </a:prstGeom>
+          <a:gradFill>
+            <a:gsLst>
+              <a:gs pos="0">
+                <a:schemeClr val="accent1"/>
+              </a:gs>
+              <a:gs pos="50000">
+                <a:schemeClr val="accent1">
+                  <a:tint val="44500"/>
+                  <a:satMod val="160000"/>
+                </a:schemeClr>
+              </a:gs>
+              <a:gs pos="100000">
+                <a:schemeClr val="accent1">
+                  <a:tint val="23500"/>
+                  <a:satMod val="160000"/>
+                </a:schemeClr>
+              </a:gs>
+            </a:gsLst>
+            <a:lin ang="5400000" scaled="0"/>
+          </a:gradFill>
+          <a:ln>
+            <a:noFill/>
+          </a:ln>
+        </p:spPr>
+        <p:style>
+          <a:lnRef idx="2">
+            <a:schemeClr val="accent1">
+              <a:shade val="50000"/>
+            </a:schemeClr>
+          </a:lnRef>
+          <a:fillRef idx="1">
+            <a:schemeClr val="accent1"/>
+          </a:fillRef>
+          <a:effectRef idx="0">
+            <a:schemeClr val="accent1"/>
+          </a:effectRef>
+          <a:fontRef idx="minor">
+            <a:schemeClr val="lt1"/>
+          </a:fontRef>
+        </p:style>
+        <p:txBody>
+          <a:bodyPr rtlCol="0" anchor="ctr"/>
+          <a:lstStyle/>
+          <a:p>
+            <a:pPr algn="ctr"/>
+            <a:endParaRPr lang="en-US" dirty="0"/>
+          </a:p>
+        </p:txBody>
+      </p:sp>
+      <p:pic>
+        <p:nvPicPr>
+          <p:cNvPr id="1030" name="Picture 6"/>
+          <p:cNvPicPr>
+            <a:picLocks noChangeAspect="1" noChangeArrowheads="1"/>
+          </p:cNvPicPr>
+          <p:nvPr/>
+        </p:nvPicPr>
+        <p:blipFill>
+          <a:blip r:embed="rId3" cstate="print"/>
+          <a:srcRect/>
+          <a:stretch>
+            <a:fillRect/>
+          </a:stretch>
+        </p:blipFill>
+        <p:spPr bwMode="auto">
+          <a:xfrm>
+            <a:off x="3810000" y="1371600"/>
+            <a:ext cx="2479184" cy="1676400"/>
+          </a:xfrm>
+          <a:prstGeom prst="rect">
+            <a:avLst/>
+          </a:prstGeom>
+          <a:noFill/>
+          <a:ln w="9525">
+            <a:noFill/>
+            <a:miter lim="800000"/>
+            <a:headEnd/>
+            <a:tailEnd/>
+          </a:ln>
+        </p:spPr>
+      </p:pic>
+      <p:pic>
+        <p:nvPicPr>
+          <p:cNvPr id="1031" name="Picture 7"/>
+          <p:cNvPicPr>
+            <a:picLocks noChangeAspect="1" noChangeArrowheads="1"/>
+          </p:cNvPicPr>
+          <p:nvPr/>
+        </p:nvPicPr>
+        <p:blipFill>
+          <a:blip r:embed="rId4" cstate="print"/>
+          <a:srcRect/>
+          <a:stretch>
+            <a:fillRect/>
+          </a:stretch>
+        </p:blipFill>
+        <p:spPr bwMode="auto">
+          <a:xfrm>
+            <a:off x="6400800" y="1371600"/>
+            <a:ext cx="2286000" cy="1676400"/>
+          </a:xfrm>
+          <a:prstGeom prst="rect">
+            <a:avLst/>
+          </a:prstGeom>
+          <a:noFill/>
+          <a:ln w="9525">
+            <a:noFill/>
+            <a:miter lim="800000"/>
+            <a:headEnd/>
+            <a:tailEnd/>
+          </a:ln>
+        </p:spPr>
+      </p:pic>
+      <p:sp>
+        <p:nvSpPr>
+          <p:cNvPr id="18" name="TextBox 17"/>
+          <p:cNvSpPr txBox="1"/>
+          <p:nvPr/>
+        </p:nvSpPr>
+        <p:spPr>
+          <a:xfrm>
+            <a:off x="3886200" y="2971800"/>
+            <a:ext cx="2362200" cy="276999"/>
+          </a:xfrm>
+          <a:prstGeom prst="rect">
+            <a:avLst/>
+          </a:prstGeom>
+          <a:noFill/>
+        </p:spPr>
+        <p:txBody>
+          <a:bodyPr wrap="square" rtlCol="0">
+            <a:spAutoFit/>
+          </a:bodyPr>
+          <a:lstStyle/>
+          <a:p>
+            <a:pPr algn="ctr"/>
+            <a:r>
+              <a:rPr lang="en-US" sz="1200" b="1" dirty="0" smtClean="0">
+                <a:latin typeface="Arial Narrow" pitchFamily="34" charset="0"/>
+              </a:rPr>
+              <a:t>Norman’s HCI Model</a:t>
+            </a:r>
+            <a:endParaRPr lang="en-US" sz="1200" b="1" dirty="0">
+              <a:latin typeface="Arial Narrow" pitchFamily="34" charset="0"/>
+            </a:endParaRPr>
+          </a:p>
+        </p:txBody>
+      </p:sp>
+      <p:sp>
+        <p:nvSpPr>
+          <p:cNvPr id="19" name="TextBox 18"/>
+          <p:cNvSpPr txBox="1"/>
+          <p:nvPr/>
+        </p:nvSpPr>
+        <p:spPr>
+          <a:xfrm>
+            <a:off x="6400800" y="2971800"/>
+            <a:ext cx="2362200" cy="276999"/>
+          </a:xfrm>
+          <a:prstGeom prst="rect">
+            <a:avLst/>
+          </a:prstGeom>
+          <a:noFill/>
+        </p:spPr>
+        <p:txBody>
+          <a:bodyPr wrap="square" rtlCol="0">
+            <a:spAutoFit/>
+          </a:bodyPr>
+          <a:lstStyle/>
+          <a:p>
+            <a:pPr algn="ctr"/>
+            <a:r>
+              <a:rPr lang="en-US" sz="1200" b="1" dirty="0" smtClean="0">
+                <a:latin typeface="Arial Narrow" pitchFamily="34" charset="0"/>
+              </a:rPr>
+              <a:t>HRI Model – Supervisor Role</a:t>
+            </a:r>
+            <a:endParaRPr lang="en-US" sz="1200" b="1" dirty="0">
+              <a:latin typeface="Arial Narrow" pitchFamily="34" charset="0"/>
+            </a:endParaRPr>
+          </a:p>
+        </p:txBody>
+      </p:sp>
+    </p:spTree>
+    <p:extLst>
+      <p:ext uri="{BB962C8B-B14F-4D97-AF65-F5344CB8AC3E}">
+        <p14:creationId xmlns:p14="http://schemas.microsoft.com/office/powerpoint/2010/main" val="1931739613"/>
+      </p:ext>
+    </p:extLst>
+  </p:cSld>
+  <p:clrMapOvr>
+    <a:masterClrMapping/>
+  </p:clrMapOvr>
+  <mc:AlternateContent xmlns:mc="http://schemas.openxmlformats.org/markup-compatibility/2006">
+    <mc:Choice xmlns:p14="http://schemas.microsoft.com/office/powerpoint/2010/main" Requires="p14">
+      <p:transition spd="slow" p14:dur="2000"/>
+    </mc:Choice>
+    <mc:Fallback>
+      <p:transition spd="slow"/>
+    </mc:Fallback>
+  </mc:AlternateContent>
+  <p:timing>
+    <p:tnLst>
+      <p:par>
+        <p:cTn id="1" dur="indefinite" restart="never" nodeType="tmRoot"/>
+      </p:par>
+    </p:tnLst>
+  </p:timing>
+</p:sld>
+</file>
+
+<file path=ppt/slides/slide5.xml><?xml version="1.0" encoding="utf-8"?>
+<p:sld xmlns:a="http://schemas.openxmlformats.org/drawingml/2006/main" xmlns:r="http://schemas.openxmlformats.org/officeDocument/2006/relationships" xmlns:p="http://schemas.openxmlformats.org/presentationml/2006/main">
+  <p:cSld>
+    <p:spTree>
+      <p:nvGrpSpPr>
+        <p:cNvPr id="1" name=""/>
+        <p:cNvGrpSpPr/>
+        <p:nvPr/>
+      </p:nvGrpSpPr>
+      <p:grpSpPr>
+        <a:xfrm>
+          <a:off x="0" y="0"/>
+          <a:ext cx="0" cy="0"/>
+          <a:chOff x="0" y="0"/>
+          <a:chExt cx="0" cy="0"/>
+        </a:xfrm>
+      </p:grpSpPr>
+      <p:sp>
+        <p:nvSpPr>
+          <p:cNvPr id="2" name="Title 1"/>
+          <p:cNvSpPr>
+            <a:spLocks noGrp="1"/>
+          </p:cNvSpPr>
+          <p:nvPr>
+            <p:ph type="title"/>
+          </p:nvPr>
+        </p:nvSpPr>
+        <p:spPr>
+          <a:xfrm>
+            <a:off x="1066800" y="274638"/>
+            <a:ext cx="7866888" cy="563562"/>
+          </a:xfrm>
+        </p:spPr>
+        <p:txBody>
+          <a:bodyPr>
+            <a:normAutofit/>
+          </a:bodyPr>
+          <a:lstStyle/>
+          <a:p>
+            <a:r>
+              <a:rPr lang="en-US" sz="2800" dirty="0" smtClean="0">
+                <a:latin typeface="Arial Narrow" pitchFamily="34" charset="0"/>
+              </a:rPr>
+              <a:t>Project Description</a:t>
+            </a:r>
+            <a:endParaRPr lang="en-US" sz="2800" dirty="0">
+              <a:latin typeface="Arial Narrow" pitchFamily="34" charset="0"/>
+            </a:endParaRPr>
+          </a:p>
+        </p:txBody>
+      </p:sp>
+      <p:sp>
+        <p:nvSpPr>
+          <p:cNvPr id="3" name="Content Placeholder 2"/>
+          <p:cNvSpPr>
+            <a:spLocks noGrp="1"/>
+          </p:cNvSpPr>
+          <p:nvPr>
+            <p:ph idx="1"/>
+          </p:nvPr>
+        </p:nvSpPr>
+        <p:spPr>
+          <a:xfrm>
+            <a:off x="990600" y="914400"/>
+            <a:ext cx="8153400" cy="5562600"/>
+          </a:xfrm>
+        </p:spPr>
+        <p:txBody>
+          <a:bodyPr/>
+          <a:lstStyle/>
+          <a:p>
+            <a:r>
+              <a:rPr lang="en-US" sz="2000" dirty="0" smtClean="0">
+                <a:latin typeface="Arial Narrow" pitchFamily="34" charset="0"/>
+              </a:rPr>
+              <a:t>Proposed components with respect to the two information representations:</a:t>
+            </a:r>
+          </a:p>
+          <a:p>
+            <a:endParaRPr lang="en-US" sz="2000" dirty="0" smtClean="0">
+              <a:latin typeface="Arial Narrow" pitchFamily="34" charset="0"/>
+            </a:endParaRPr>
+          </a:p>
+          <a:p>
+            <a:endParaRPr lang="en-US" sz="2000" dirty="0" smtClean="0">
+              <a:latin typeface="Arial Narrow" pitchFamily="34" charset="0"/>
+            </a:endParaRPr>
+          </a:p>
+        </p:txBody>
+      </p:sp>
+      <p:sp>
+        <p:nvSpPr>
+          <p:cNvPr id="4" name="Slide Number Placeholder 3"/>
+          <p:cNvSpPr>
+            <a:spLocks noGrp="1"/>
+          </p:cNvSpPr>
+          <p:nvPr>
+            <p:ph type="sldNum" sz="quarter" idx="12"/>
+          </p:nvPr>
+        </p:nvSpPr>
+        <p:spPr/>
+        <p:txBody>
+          <a:bodyPr/>
+          <a:lstStyle/>
+          <a:p>
+            <a:fld id="{80BAA4AE-BA16-457B-8F87-F96B0CF5E51B}" type="slidenum">
+              <a:rPr lang="en-US" smtClean="0"/>
+              <a:pPr/>
+              <a:t>5</a:t>
+            </a:fld>
+            <a:endParaRPr lang="en-US" dirty="0"/>
+          </a:p>
+        </p:txBody>
+      </p:sp>
+      <p:sp>
+        <p:nvSpPr>
+          <p:cNvPr id="5" name="Rectangle 4"/>
+          <p:cNvSpPr/>
+          <p:nvPr/>
+        </p:nvSpPr>
+        <p:spPr>
+          <a:xfrm>
+            <a:off x="1219200" y="868362"/>
+            <a:ext cx="7620000" cy="45719"/>
+          </a:xfrm>
+          <a:prstGeom prst="rect">
+            <a:avLst/>
+          </a:prstGeom>
+          <a:gradFill>
+            <a:gsLst>
+              <a:gs pos="0">
+                <a:schemeClr val="accent1"/>
+              </a:gs>
+              <a:gs pos="50000">
+                <a:schemeClr val="accent1">
+                  <a:tint val="44500"/>
+                  <a:satMod val="160000"/>
+                </a:schemeClr>
+              </a:gs>
+              <a:gs pos="100000">
+                <a:schemeClr val="accent1">
+                  <a:tint val="23500"/>
+                  <a:satMod val="160000"/>
+                </a:schemeClr>
+              </a:gs>
+            </a:gsLst>
+            <a:lin ang="5400000" scaled="0"/>
+          </a:gradFill>
+          <a:ln>
+            <a:noFill/>
+          </a:ln>
+        </p:spPr>
+        <p:style>
+          <a:lnRef idx="2">
+            <a:schemeClr val="accent1">
+              <a:shade val="50000"/>
+            </a:schemeClr>
+          </a:lnRef>
+          <a:fillRef idx="1">
+            <a:schemeClr val="accent1"/>
+          </a:fillRef>
+          <a:effectRef idx="0">
+            <a:schemeClr val="accent1"/>
+          </a:effectRef>
+          <a:fontRef idx="minor">
+            <a:schemeClr val="lt1"/>
+          </a:fontRef>
+        </p:style>
+        <p:txBody>
+          <a:bodyPr rtlCol="0" anchor="ctr"/>
+          <a:lstStyle/>
+          <a:p>
+            <a:pPr algn="ctr"/>
+            <a:endParaRPr lang="en-US" dirty="0"/>
+          </a:p>
+        </p:txBody>
+      </p:sp>
+      <p:graphicFrame>
+        <p:nvGraphicFramePr>
+          <p:cNvPr id="7" name="Table 6"/>
+          <p:cNvGraphicFramePr>
+            <a:graphicFrameLocks noGrp="1"/>
+          </p:cNvGraphicFramePr>
+          <p:nvPr>
+            <p:extLst>
+              <p:ext uri="{D42A27DB-BD31-4B8C-83A1-F6EECF244321}">
+                <p14:modId xmlns:p14="http://schemas.microsoft.com/office/powerpoint/2010/main" val="2578779233"/>
+              </p:ext>
+            </p:extLst>
+          </p:nvPr>
+        </p:nvGraphicFramePr>
+        <p:xfrm>
+          <a:off x="1295400" y="1905000"/>
+          <a:ext cx="7162801" cy="3657600"/>
+        </p:xfrm>
+        <a:graphic>
+          <a:graphicData uri="http://schemas.openxmlformats.org/drawingml/2006/table">
+            <a:tbl>
+              <a:tblPr firstRow="1" bandRow="1">
+                <a:tableStyleId>{5C22544A-7EE6-4342-B048-85BDC9FD1C3A}</a:tableStyleId>
+              </a:tblPr>
+              <a:tblGrid>
+                <a:gridCol w="1802130"/>
+                <a:gridCol w="2769870"/>
+                <a:gridCol w="2590801"/>
+              </a:tblGrid>
+              <a:tr h="821101">
+                <a:tc>
+                  <a:txBody>
+                    <a:bodyPr/>
+                    <a:lstStyle/>
+                    <a:p>
+                      <a:endParaRPr lang="en-US" dirty="0">
+                        <a:latin typeface="Arial Narrow" pitchFamily="34" charset="0"/>
+                      </a:endParaRPr>
+                    </a:p>
+                  </a:txBody>
+                  <a:tcPr anchor="ctr">
+                    <a:cell3D prstMaterial="dkEdge">
+                      <a:bevel w="25400" h="25400" prst="angle"/>
+                      <a:lightRig rig="flood" dir="t"/>
+                    </a:cell3D>
+                  </a:tcPr>
+                </a:tc>
+                <a:tc>
+                  <a:txBody>
+                    <a:bodyPr/>
+                    <a:lstStyle/>
+                    <a:p>
+                      <a:pPr algn="ctr"/>
+                      <a:r>
+                        <a:rPr lang="en-US" dirty="0" smtClean="0">
+                          <a:latin typeface="Arial Narrow" pitchFamily="34" charset="0"/>
+                        </a:rPr>
+                        <a:t>Probability Distribution</a:t>
+                      </a:r>
+                      <a:r>
+                        <a:rPr lang="en-US" baseline="0" dirty="0" smtClean="0">
+                          <a:latin typeface="Arial Narrow" pitchFamily="34" charset="0"/>
+                        </a:rPr>
+                        <a:t> Map</a:t>
+                      </a:r>
+                      <a:endParaRPr lang="en-US" dirty="0">
+                        <a:latin typeface="Arial Narrow" pitchFamily="34" charset="0"/>
+                      </a:endParaRPr>
+                    </a:p>
+                  </a:txBody>
+                  <a:tcPr anchor="ctr">
+                    <a:cell3D prstMaterial="dkEdge">
+                      <a:bevel w="25400" h="25400" prst="angle"/>
+                      <a:lightRig rig="flood" dir="t"/>
+                    </a:cell3D>
+                  </a:tcPr>
+                </a:tc>
+                <a:tc>
+                  <a:txBody>
+                    <a:bodyPr/>
+                    <a:lstStyle/>
+                    <a:p>
+                      <a:pPr algn="ctr"/>
+                      <a:r>
+                        <a:rPr lang="en-US" dirty="0" smtClean="0">
+                          <a:latin typeface="Arial Narrow" pitchFamily="34" charset="0"/>
+                        </a:rPr>
+                        <a:t>Task-Difficulty</a:t>
+                      </a:r>
+                      <a:r>
+                        <a:rPr lang="en-US" baseline="0" dirty="0" smtClean="0">
+                          <a:latin typeface="Arial Narrow" pitchFamily="34" charset="0"/>
+                        </a:rPr>
+                        <a:t> Map</a:t>
+                      </a:r>
+                      <a:endParaRPr lang="en-US" dirty="0">
+                        <a:latin typeface="Arial Narrow" pitchFamily="34" charset="0"/>
+                      </a:endParaRPr>
+                    </a:p>
+                  </a:txBody>
+                  <a:tcPr anchor="ctr">
+                    <a:cell3D prstMaterial="dkEdge">
+                      <a:bevel w="25400" h="25400" prst="angle"/>
+                      <a:lightRig rig="flood" dir="t"/>
+                    </a:cell3D>
+                  </a:tcPr>
+                </a:tc>
+              </a:tr>
+              <a:tr h="766360">
+                <a:tc>
+                  <a:txBody>
+                    <a:bodyPr/>
+                    <a:lstStyle/>
+                    <a:p>
+                      <a:r>
+                        <a:rPr lang="en-US" dirty="0" smtClean="0">
+                          <a:latin typeface="Arial Narrow" pitchFamily="34" charset="0"/>
+                        </a:rPr>
+                        <a:t>Strategic</a:t>
+                      </a:r>
+                      <a:endParaRPr lang="en-US" dirty="0">
+                        <a:latin typeface="Arial Narrow" pitchFamily="34" charset="0"/>
+                      </a:endParaRPr>
+                    </a:p>
+                  </a:txBody>
+                  <a:tcPr anchor="ctr">
+                    <a:cell3D prstMaterial="dkEdge">
+                      <a:bevel w="25400" h="25400" prst="angle"/>
+                      <a:lightRig rig="flood" dir="t"/>
+                    </a:cell3D>
+                    <a:solidFill>
+                      <a:schemeClr val="accent4">
+                        <a:lumMod val="40000"/>
+                        <a:lumOff val="60000"/>
+                      </a:schemeClr>
+                    </a:solidFill>
+                  </a:tcPr>
+                </a:tc>
+                <a:tc>
+                  <a:txBody>
+                    <a:bodyPr/>
+                    <a:lstStyle/>
+                    <a:p>
+                      <a:pPr algn="ctr"/>
+                      <a:r>
+                        <a:rPr lang="en-US" b="1" dirty="0" smtClean="0">
+                          <a:solidFill>
+                            <a:srgbClr val="6600FF"/>
+                          </a:solidFill>
+                          <a:latin typeface="Arial Narrow" pitchFamily="34" charset="0"/>
+                        </a:rPr>
+                        <a:t>DistCreate</a:t>
+                      </a:r>
+                      <a:r>
+                        <a:rPr lang="en-US" dirty="0" smtClean="0">
+                          <a:latin typeface="Arial Narrow" pitchFamily="34" charset="0"/>
+                        </a:rPr>
+                        <a:t> </a:t>
+                      </a:r>
+                      <a:r>
+                        <a:rPr lang="en-US" dirty="0" smtClean="0">
+                          <a:latin typeface="Arial Narrow" pitchFamily="34" charset="0"/>
+                        </a:rPr>
+                        <a:t>for map </a:t>
+                      </a:r>
+                      <a:r>
+                        <a:rPr lang="en-US" dirty="0" smtClean="0">
+                          <a:latin typeface="Arial Narrow" pitchFamily="34" charset="0"/>
+                        </a:rPr>
+                        <a:t>creation</a:t>
+                      </a:r>
+                      <a:endParaRPr lang="en-US" dirty="0" smtClean="0">
+                        <a:latin typeface="Arial Narrow" pitchFamily="34" charset="0"/>
+                      </a:endParaRPr>
+                    </a:p>
+                  </a:txBody>
+                  <a:tcPr anchor="ctr">
+                    <a:cell3D prstMaterial="dkEdge">
+                      <a:bevel w="25400" h="25400" prst="angle"/>
+                      <a:lightRig rig="flood" dir="t"/>
+                    </a:cell3D>
+                  </a:tcPr>
+                </a:tc>
+                <a:tc>
+                  <a:txBody>
+                    <a:bodyPr/>
+                    <a:lstStyle/>
+                    <a:p>
+                      <a:pPr marL="0" marR="0" indent="0" algn="ctr" defTabSz="914400" rtl="0" eaLnBrk="1" fontAlgn="auto" latinLnBrk="0" hangingPunct="1">
+                        <a:lnSpc>
+                          <a:spcPct val="100000"/>
+                        </a:lnSpc>
+                        <a:spcBef>
+                          <a:spcPts val="0"/>
+                        </a:spcBef>
+                        <a:spcAft>
+                          <a:spcPts val="0"/>
+                        </a:spcAft>
+                        <a:buClrTx/>
+                        <a:buSzTx/>
+                        <a:buFontTx/>
+                        <a:buNone/>
+                        <a:tabLst/>
+                        <a:defRPr/>
+                      </a:pPr>
+                      <a:r>
+                        <a:rPr lang="en-US" b="1" dirty="0" smtClean="0">
+                          <a:solidFill>
+                            <a:srgbClr val="6600FF"/>
+                          </a:solidFill>
+                          <a:latin typeface="Arial Narrow" pitchFamily="34" charset="0"/>
+                        </a:rPr>
+                        <a:t>DiffCreate</a:t>
+                      </a:r>
+                      <a:r>
+                        <a:rPr lang="en-US" dirty="0" smtClean="0">
+                          <a:latin typeface="Arial Narrow" pitchFamily="34" charset="0"/>
+                        </a:rPr>
+                        <a:t> for map creation</a:t>
+                      </a:r>
+                      <a:endParaRPr lang="en-US" dirty="0">
+                        <a:latin typeface="Arial Narrow" pitchFamily="34" charset="0"/>
+                      </a:endParaRPr>
+                    </a:p>
+                  </a:txBody>
+                  <a:tcPr anchor="ctr">
+                    <a:cell3D prstMaterial="dkEdge">
+                      <a:bevel w="25400" h="25400" prst="angle"/>
+                      <a:lightRig rig="flood" dir="t"/>
+                    </a:cell3D>
+                  </a:tcPr>
+                </a:tc>
+              </a:tr>
+              <a:tr h="766360">
+                <a:tc>
+                  <a:txBody>
+                    <a:bodyPr/>
+                    <a:lstStyle/>
+                    <a:p>
+                      <a:r>
+                        <a:rPr lang="en-US" dirty="0" smtClean="0">
+                          <a:latin typeface="Arial Narrow" pitchFamily="34" charset="0"/>
+                        </a:rPr>
+                        <a:t>Between-Episodes</a:t>
+                      </a:r>
+                      <a:endParaRPr lang="en-US" dirty="0">
+                        <a:latin typeface="Arial Narrow" pitchFamily="34" charset="0"/>
+                      </a:endParaRPr>
+                    </a:p>
+                  </a:txBody>
+                  <a:tcPr anchor="ctr">
+                    <a:cell3D prstMaterial="dkEdge">
+                      <a:bevel w="25400" h="25400" prst="angle"/>
+                      <a:lightRig rig="flood" dir="t"/>
+                    </a:cell3D>
+                    <a:solidFill>
+                      <a:schemeClr val="accent4">
+                        <a:lumMod val="40000"/>
+                        <a:lumOff val="60000"/>
+                      </a:schemeClr>
+                    </a:solidFill>
+                  </a:tcPr>
+                </a:tc>
+                <a:tc>
+                  <a:txBody>
+                    <a:bodyPr/>
+                    <a:lstStyle/>
+                    <a:p>
+                      <a:pPr algn="ctr"/>
+                      <a:r>
+                        <a:rPr lang="en-US" b="1" dirty="0" smtClean="0">
+                          <a:solidFill>
+                            <a:srgbClr val="6600FF"/>
+                          </a:solidFill>
+                          <a:latin typeface="Arial Narrow" pitchFamily="34" charset="0"/>
+                        </a:rPr>
+                        <a:t>DistEdit</a:t>
+                      </a:r>
+                      <a:r>
+                        <a:rPr lang="en-US" dirty="0" smtClean="0">
+                          <a:latin typeface="Arial Narrow" pitchFamily="34" charset="0"/>
+                        </a:rPr>
+                        <a:t> </a:t>
+                      </a:r>
+                      <a:r>
+                        <a:rPr lang="en-US" dirty="0" smtClean="0">
+                          <a:latin typeface="Arial Narrow" pitchFamily="34" charset="0"/>
+                        </a:rPr>
+                        <a:t>for map update</a:t>
+                      </a:r>
+                    </a:p>
+                    <a:p>
+                      <a:pPr algn="ctr"/>
+                      <a:r>
+                        <a:rPr lang="en-US" dirty="0" smtClean="0">
+                          <a:latin typeface="Arial Narrow" pitchFamily="34" charset="0"/>
+                        </a:rPr>
+                        <a:t>and info management</a:t>
+                      </a:r>
+                      <a:endParaRPr lang="en-US" dirty="0">
+                        <a:latin typeface="Arial Narrow" pitchFamily="34" charset="0"/>
+                      </a:endParaRPr>
+                    </a:p>
+                  </a:txBody>
+                  <a:tcPr anchor="ctr">
+                    <a:cell3D prstMaterial="dkEdge">
+                      <a:bevel w="25400" h="25400" prst="angle"/>
+                      <a:lightRig rig="flood" dir="t"/>
+                    </a:cell3D>
+                  </a:tcPr>
+                </a:tc>
+                <a:tc>
+                  <a:txBody>
+                    <a:bodyPr/>
+                    <a:lstStyle/>
+                    <a:p>
+                      <a:pPr algn="ctr"/>
+                      <a:r>
+                        <a:rPr lang="en-US" b="1" dirty="0" smtClean="0">
+                          <a:solidFill>
+                            <a:srgbClr val="6600FF"/>
+                          </a:solidFill>
+                          <a:latin typeface="Arial Narrow" pitchFamily="34" charset="0"/>
+                        </a:rPr>
+                        <a:t>DiffEdit</a:t>
+                      </a:r>
+                      <a:r>
+                        <a:rPr lang="en-US" dirty="0" smtClean="0">
+                          <a:latin typeface="Arial Narrow" pitchFamily="34" charset="0"/>
+                        </a:rPr>
+                        <a:t> </a:t>
+                      </a:r>
+                      <a:r>
+                        <a:rPr lang="en-US" dirty="0" smtClean="0">
+                          <a:latin typeface="Arial Narrow" pitchFamily="34" charset="0"/>
+                        </a:rPr>
+                        <a:t>for map update</a:t>
+                      </a:r>
+                    </a:p>
+                    <a:p>
+                      <a:pPr algn="ctr"/>
+                      <a:r>
+                        <a:rPr lang="en-US" dirty="0" smtClean="0">
+                          <a:latin typeface="Arial Narrow" pitchFamily="34" charset="0"/>
+                        </a:rPr>
+                        <a:t>and info management</a:t>
+                      </a:r>
+                      <a:endParaRPr lang="en-US" dirty="0">
+                        <a:latin typeface="Arial Narrow" pitchFamily="34" charset="0"/>
+                      </a:endParaRPr>
+                    </a:p>
+                  </a:txBody>
+                  <a:tcPr anchor="ctr">
+                    <a:cell3D prstMaterial="dkEdge">
+                      <a:bevel w="25400" h="25400" prst="angle"/>
+                      <a:lightRig rig="flood" dir="t"/>
+                    </a:cell3D>
+                  </a:tcPr>
+                </a:tc>
+              </a:tr>
+              <a:tr h="839347">
+                <a:tc rowSpan="2">
+                  <a:txBody>
+                    <a:bodyPr/>
+                    <a:lstStyle/>
+                    <a:p>
+                      <a:r>
+                        <a:rPr lang="en-US" dirty="0" smtClean="0">
+                          <a:latin typeface="Arial Narrow" pitchFamily="34" charset="0"/>
+                        </a:rPr>
+                        <a:t>Within-Episode</a:t>
+                      </a:r>
+                      <a:endParaRPr lang="en-US" dirty="0">
+                        <a:latin typeface="Arial Narrow" pitchFamily="34" charset="0"/>
+                      </a:endParaRPr>
+                    </a:p>
+                  </a:txBody>
+                  <a:tcPr anchor="ctr">
+                    <a:cell3D prstMaterial="dkEdge">
+                      <a:bevel w="25400" h="25400" prst="angle"/>
+                      <a:lightRig rig="flood" dir="t"/>
+                    </a:cell3D>
+                    <a:solidFill>
+                      <a:schemeClr val="accent4">
+                        <a:lumMod val="40000"/>
+                        <a:lumOff val="60000"/>
+                      </a:schemeClr>
+                    </a:solidFill>
+                  </a:tcPr>
+                </a:tc>
+                <a:tc gridSpan="2">
+                  <a:txBody>
+                    <a:bodyPr/>
+                    <a:lstStyle/>
+                    <a:p>
+                      <a:pPr algn="ctr"/>
+                      <a:r>
+                        <a:rPr lang="en-US" b="1" dirty="0" smtClean="0">
+                          <a:solidFill>
+                            <a:srgbClr val="6600FF"/>
+                          </a:solidFill>
+                          <a:latin typeface="Arial Narrow" pitchFamily="34" charset="0"/>
+                        </a:rPr>
+                        <a:t>IPPA path planning </a:t>
+                      </a:r>
+                      <a:r>
+                        <a:rPr lang="en-US" b="1" smtClean="0">
+                          <a:solidFill>
+                            <a:srgbClr val="6600FF"/>
+                          </a:solidFill>
+                          <a:latin typeface="Arial Narrow" pitchFamily="34" charset="0"/>
+                        </a:rPr>
+                        <a:t>algorithms</a:t>
+                      </a:r>
+                      <a:r>
+                        <a:rPr lang="en-US" smtClean="0">
+                          <a:latin typeface="Arial Narrow" pitchFamily="34" charset="0"/>
+                        </a:rPr>
+                        <a:t> that support</a:t>
+                      </a:r>
+                      <a:r>
+                        <a:rPr lang="en-US" dirty="0" smtClean="0">
+                          <a:latin typeface="Arial Narrow" pitchFamily="34" charset="0"/>
+                        </a:rPr>
+                        <a:t>: </a:t>
+                      </a:r>
+                    </a:p>
+                    <a:p>
+                      <a:pPr algn="ctr"/>
+                      <a:r>
+                        <a:rPr lang="en-US" dirty="0" smtClean="0">
+                          <a:solidFill>
+                            <a:srgbClr val="FF0000"/>
+                          </a:solidFill>
+                          <a:latin typeface="Arial Narrow" pitchFamily="34" charset="0"/>
+                        </a:rPr>
+                        <a:t>real-time feedback </a:t>
+                      </a:r>
+                      <a:r>
+                        <a:rPr lang="en-US" dirty="0" smtClean="0">
+                          <a:latin typeface="Arial Narrow" pitchFamily="34" charset="0"/>
+                        </a:rPr>
+                        <a:t>and </a:t>
+                      </a:r>
+                      <a:r>
+                        <a:rPr lang="en-US" dirty="0" smtClean="0">
+                          <a:solidFill>
+                            <a:srgbClr val="FF0000"/>
+                          </a:solidFill>
+                          <a:latin typeface="Arial Narrow" pitchFamily="34" charset="0"/>
+                        </a:rPr>
+                        <a:t>partial detection</a:t>
+                      </a:r>
+                      <a:endParaRPr lang="en-US" dirty="0">
+                        <a:solidFill>
+                          <a:srgbClr val="FF0000"/>
+                        </a:solidFill>
+                        <a:latin typeface="Arial Narrow" pitchFamily="34" charset="0"/>
+                      </a:endParaRPr>
+                    </a:p>
+                  </a:txBody>
+                  <a:tcPr anchor="ctr">
+                    <a:cell3D prstMaterial="dkEdge">
+                      <a:bevel w="25400" h="25400" prst="angle"/>
+                      <a:lightRig rig="flood" dir="t"/>
+                    </a:cell3D>
+                  </a:tcPr>
+                </a:tc>
+                <a:tc hMerge="1">
+                  <a:txBody>
+                    <a:bodyPr/>
+                    <a:lstStyle/>
+                    <a:p>
+                      <a:pPr algn="ctr"/>
+                      <a:endParaRPr lang="en-US" dirty="0">
+                        <a:solidFill>
+                          <a:srgbClr val="FF0000"/>
+                        </a:solidFill>
+                        <a:latin typeface="Arial Narrow" pitchFamily="34" charset="0"/>
+                      </a:endParaRPr>
+                    </a:p>
+                  </a:txBody>
+                  <a:tcPr anchor="ctr">
+                    <a:cell3D prstMaterial="dkEdge">
+                      <a:bevel w="25400" h="25400" prst="angle"/>
+                      <a:lightRig rig="flood" dir="t"/>
+                    </a:cell3D>
+                  </a:tcPr>
+                </a:tc>
+              </a:tr>
+              <a:tr h="464432">
+                <a:tc vMerge="1">
+                  <a:txBody>
+                    <a:bodyPr/>
+                    <a:lstStyle/>
+                    <a:p>
+                      <a:endParaRPr lang="en-US"/>
+                    </a:p>
+                  </a:txBody>
+                  <a:tcPr/>
+                </a:tc>
+                <a:tc gridSpan="2">
+                  <a:txBody>
+                    <a:bodyPr/>
+                    <a:lstStyle/>
+                    <a:p>
+                      <a:pPr algn="ctr"/>
+                      <a:r>
+                        <a:rPr lang="en-US" b="1" dirty="0" smtClean="0">
+                          <a:solidFill>
+                            <a:srgbClr val="6600FF"/>
+                          </a:solidFill>
+                          <a:latin typeface="Arial Narrow" pitchFamily="34" charset="0"/>
+                        </a:rPr>
+                        <a:t>SlidingAutonomy</a:t>
+                      </a:r>
+                      <a:r>
+                        <a:rPr lang="en-US" dirty="0" smtClean="0">
+                          <a:latin typeface="Arial Narrow" pitchFamily="34" charset="0"/>
+                        </a:rPr>
+                        <a:t> interface for autonomy </a:t>
+                      </a:r>
+                      <a:r>
+                        <a:rPr lang="en-US" dirty="0" smtClean="0">
+                          <a:latin typeface="Arial Narrow" pitchFamily="34" charset="0"/>
+                        </a:rPr>
+                        <a:t>management</a:t>
+                      </a:r>
+                      <a:endParaRPr lang="en-US" dirty="0">
+                        <a:latin typeface="Arial Narrow" pitchFamily="34" charset="0"/>
+                      </a:endParaRPr>
+                    </a:p>
+                  </a:txBody>
+                  <a:tcPr anchor="ctr">
+                    <a:cell3D prstMaterial="dkEdge">
+                      <a:bevel w="25400" h="25400" prst="angle"/>
+                      <a:lightRig rig="flood" dir="t"/>
+                    </a:cell3D>
+                  </a:tcPr>
+                </a:tc>
+                <a:tc hMerge="1">
+                  <a:txBody>
+                    <a:bodyPr/>
+                    <a:lstStyle/>
+                    <a:p>
+                      <a:endParaRPr lang="en-US" dirty="0"/>
+                    </a:p>
+                  </a:txBody>
+                  <a:tcPr>
+                    <a:cell3D prstMaterial="dkEdge">
+                      <a:bevel w="25400" h="25400" prst="angle"/>
+                      <a:lightRig rig="flood" dir="t"/>
+                    </a:cell3D>
+                  </a:tcPr>
+                </a:tc>
+              </a:tr>
+            </a:tbl>
+          </a:graphicData>
+        </a:graphic>
+      </p:graphicFrame>
+      <p:pic>
+        <p:nvPicPr>
+          <p:cNvPr id="8" name="Picture 4" descr="UAV_transparent"/>
+          <p:cNvPicPr>
+            <a:picLocks noChangeAspect="1" noChangeArrowheads="1"/>
+          </p:cNvPicPr>
+          <p:nvPr/>
+        </p:nvPicPr>
+        <p:blipFill>
+          <a:blip r:embed="rId3" cstate="print"/>
+          <a:srcRect/>
+          <a:stretch>
+            <a:fillRect/>
+          </a:stretch>
+        </p:blipFill>
+        <p:spPr>
+          <a:xfrm>
+            <a:off x="6781800" y="381000"/>
+            <a:ext cx="1524000" cy="401638"/>
+          </a:xfrm>
+          <a:prstGeom prst="rect">
+            <a:avLst/>
+          </a:prstGeom>
+          <a:noFill/>
+        </p:spPr>
+      </p:pic>
+    </p:spTree>
+    <p:extLst>
+      <p:ext uri="{BB962C8B-B14F-4D97-AF65-F5344CB8AC3E}">
+        <p14:creationId xmlns:p14="http://schemas.microsoft.com/office/powerpoint/2010/main" val="2522961165"/>
       </p:ext>
     </p:extLst>
   </p:cSld>

</xml_diff>